<commit_message>
Added descriptive statistics to lecture 7.
</commit_message>
<xml_diff>
--- a/bin/survival lecture 7.pptx
+++ b/bin/survival lecture 7.pptx
@@ -5,10 +5,10 @@
     <p:sldMasterId id="2147483664" r:id="rId1"/>
   </p:sldMasterIdLst>
   <p:notesMasterIdLst>
-    <p:notesMasterId r:id="rId18"/>
+    <p:notesMasterId r:id="rId30"/>
   </p:notesMasterIdLst>
   <p:handoutMasterIdLst>
-    <p:handoutMasterId r:id="rId19"/>
+    <p:handoutMasterId r:id="rId31"/>
   </p:handoutMasterIdLst>
   <p:sldIdLst>
     <p:sldId id="256" r:id="rId2"/>
@@ -21,12 +21,24 @@
     <p:sldId id="428" r:id="rId9"/>
     <p:sldId id="429" r:id="rId10"/>
     <p:sldId id="432" r:id="rId11"/>
-    <p:sldId id="434" r:id="rId12"/>
-    <p:sldId id="435" r:id="rId13"/>
-    <p:sldId id="436" r:id="rId14"/>
-    <p:sldId id="437" r:id="rId15"/>
-    <p:sldId id="433" r:id="rId16"/>
-    <p:sldId id="342" r:id="rId17"/>
+    <p:sldId id="438" r:id="rId12"/>
+    <p:sldId id="439" r:id="rId13"/>
+    <p:sldId id="441" r:id="rId14"/>
+    <p:sldId id="440" r:id="rId15"/>
+    <p:sldId id="442" r:id="rId16"/>
+    <p:sldId id="443" r:id="rId17"/>
+    <p:sldId id="444" r:id="rId18"/>
+    <p:sldId id="445" r:id="rId19"/>
+    <p:sldId id="447" r:id="rId20"/>
+    <p:sldId id="448" r:id="rId21"/>
+    <p:sldId id="449" r:id="rId22"/>
+    <p:sldId id="434" r:id="rId23"/>
+    <p:sldId id="446" r:id="rId24"/>
+    <p:sldId id="435" r:id="rId25"/>
+    <p:sldId id="436" r:id="rId26"/>
+    <p:sldId id="437" r:id="rId27"/>
+    <p:sldId id="433" r:id="rId28"/>
+    <p:sldId id="342" r:id="rId29"/>
   </p:sldIdLst>
   <p:sldSz cx="9144000" cy="6858000" type="screen4x3"/>
   <p:notesSz cx="9601200" cy="7315200"/>
@@ -4042,7 +4054,7 @@
           <a:p>
             <a:r>
               <a:rPr lang="en-US" dirty="0"/>
-              <a:t>Frailty models</a:t>
+              <a:t>Frailty/cluster models</a:t>
             </a:r>
           </a:p>
         </p:txBody>
@@ -4064,7 +4076,7 @@
           <a:p>
             <a:r>
               <a:rPr lang="en-US" sz="1800" dirty="0"/>
-              <a:t>Frailty models account for correlation within a group.</a:t>
+              <a:t>Frailty/cluster models account for correlation within a group.</a:t>
             </a:r>
           </a:p>
           <a:p>
@@ -4268,7 +4280,138 @@
           <a:p>
             <a:r>
               <a:rPr lang="en-US" dirty="0"/>
-              <a:t>Cluster models</a:t>
+              <a:t>Ashkenazi data set</a:t>
+            </a:r>
+          </a:p>
+        </p:txBody>
+      </p:sp>
+      <p:sp>
+        <p:nvSpPr>
+          <p:cNvPr id="3" name="Text Placeholder 2"/>
+          <p:cNvSpPr>
+            <a:spLocks noGrp="1"/>
+          </p:cNvSpPr>
+          <p:nvPr>
+            <p:ph type="body" idx="1"/>
+          </p:nvPr>
+        </p:nvSpPr>
+        <p:spPr/>
+        <p:txBody>
+          <a:bodyPr/>
+          <a:lstStyle/>
+          <a:p>
+            <a:r>
+              <a:rPr lang="en-US" sz="1800" b="1" dirty="0">
+                <a:latin typeface="Courier New" panose="02070309020205020404" pitchFamily="49" charset="0"/>
+                <a:cs typeface="Courier New" panose="02070309020205020404" pitchFamily="49" charset="0"/>
+              </a:rPr>
+              <a:t>This is a random subset of data from the </a:t>
+            </a:r>
+            <a:r>
+              <a:rPr lang="en-US" sz="1800" b="1" dirty="0" err="1">
+                <a:latin typeface="Courier New" panose="02070309020205020404" pitchFamily="49" charset="0"/>
+                <a:cs typeface="Courier New" panose="02070309020205020404" pitchFamily="49" charset="0"/>
+              </a:rPr>
+              <a:t>Struewing</a:t>
+            </a:r>
+            <a:r>
+              <a:rPr lang="en-US" sz="1800" b="1" dirty="0">
+                <a:latin typeface="Courier New" panose="02070309020205020404" pitchFamily="49" charset="0"/>
+                <a:cs typeface="Courier New" panose="02070309020205020404" pitchFamily="49" charset="0"/>
+              </a:rPr>
+              <a:t> et al. (1997) study of Ashkenazi </a:t>
+            </a:r>
+            <a:r>
+              <a:rPr lang="en-US" sz="1800" b="1" dirty="0" err="1">
+                <a:latin typeface="Courier New" panose="02070309020205020404" pitchFamily="49" charset="0"/>
+                <a:cs typeface="Courier New" panose="02070309020205020404" pitchFamily="49" charset="0"/>
+              </a:rPr>
+              <a:t>jews</a:t>
+            </a:r>
+            <a:r>
+              <a:rPr lang="en-US" sz="1800" b="1" dirty="0">
+                <a:latin typeface="Courier New" panose="02070309020205020404" pitchFamily="49" charset="0"/>
+                <a:cs typeface="Courier New" panose="02070309020205020404" pitchFamily="49" charset="0"/>
+              </a:rPr>
+              <a:t> and breast cancer. The subset consists of pairs of first-degree female relatives who are also first degree relatives of a proband.</a:t>
+            </a:r>
+          </a:p>
+          <a:p>
+            <a:endParaRPr lang="en-US" sz="1800" b="1" dirty="0">
+              <a:latin typeface="Courier New" panose="02070309020205020404" pitchFamily="49" charset="0"/>
+              <a:cs typeface="Courier New" panose="02070309020205020404" pitchFamily="49" charset="0"/>
+            </a:endParaRPr>
+          </a:p>
+          <a:p>
+            <a:r>
+              <a:rPr lang="en-US" sz="1800" b="1" dirty="0" err="1">
+                <a:latin typeface="Courier New" panose="02070309020205020404" pitchFamily="49" charset="0"/>
+                <a:cs typeface="Courier New" panose="02070309020205020404" pitchFamily="49" charset="0"/>
+              </a:rPr>
+              <a:t>Struewing</a:t>
+            </a:r>
+            <a:r>
+              <a:rPr lang="en-US" sz="1800" b="1" dirty="0">
+                <a:latin typeface="Courier New" panose="02070309020205020404" pitchFamily="49" charset="0"/>
+                <a:cs typeface="Courier New" panose="02070309020205020404" pitchFamily="49" charset="0"/>
+              </a:rPr>
+              <a:t> JP, </a:t>
+            </a:r>
+            <a:r>
+              <a:rPr lang="en-US" sz="1800" b="1" dirty="0" err="1">
+                <a:latin typeface="Courier New" panose="02070309020205020404" pitchFamily="49" charset="0"/>
+                <a:cs typeface="Courier New" panose="02070309020205020404" pitchFamily="49" charset="0"/>
+              </a:rPr>
+              <a:t>Hartge</a:t>
+            </a:r>
+            <a:r>
+              <a:rPr lang="en-US" sz="1800" b="1" dirty="0">
+                <a:latin typeface="Courier New" panose="02070309020205020404" pitchFamily="49" charset="0"/>
+                <a:cs typeface="Courier New" panose="02070309020205020404" pitchFamily="49" charset="0"/>
+              </a:rPr>
+              <a:t> P, </a:t>
+            </a:r>
+            <a:r>
+              <a:rPr lang="en-US" sz="1800" b="1" dirty="0" err="1">
+                <a:latin typeface="Courier New" panose="02070309020205020404" pitchFamily="49" charset="0"/>
+                <a:cs typeface="Courier New" panose="02070309020205020404" pitchFamily="49" charset="0"/>
+              </a:rPr>
+              <a:t>Wacholder</a:t>
+            </a:r>
+            <a:r>
+              <a:rPr lang="en-US" sz="1800" b="1" dirty="0">
+                <a:latin typeface="Courier New" panose="02070309020205020404" pitchFamily="49" charset="0"/>
+                <a:cs typeface="Courier New" panose="02070309020205020404" pitchFamily="49" charset="0"/>
+              </a:rPr>
+              <a:t> S, Baker SM, Berlin M, McAdams M, Timmerman MM, Brody LC, and Tucker MA (1997) The risk of cancer associated with specific mutations of BRCA1 and BRCA2 among </a:t>
+            </a:r>
+            <a:r>
+              <a:rPr lang="en-US" sz="1800" b="1" dirty="0" err="1">
+                <a:latin typeface="Courier New" panose="02070309020205020404" pitchFamily="49" charset="0"/>
+                <a:cs typeface="Courier New" panose="02070309020205020404" pitchFamily="49" charset="0"/>
+              </a:rPr>
+              <a:t>ashkenazi</a:t>
+            </a:r>
+            <a:r>
+              <a:rPr lang="en-US" sz="1800" b="1" dirty="0">
+                <a:latin typeface="Courier New" panose="02070309020205020404" pitchFamily="49" charset="0"/>
+                <a:cs typeface="Courier New" panose="02070309020205020404" pitchFamily="49" charset="0"/>
+              </a:rPr>
+              <a:t> </a:t>
+            </a:r>
+            <a:r>
+              <a:rPr lang="en-US" sz="1800" b="1" dirty="0" err="1">
+                <a:latin typeface="Courier New" panose="02070309020205020404" pitchFamily="49" charset="0"/>
+                <a:cs typeface="Courier New" panose="02070309020205020404" pitchFamily="49" charset="0"/>
+              </a:rPr>
+              <a:t>jews</a:t>
+            </a:r>
+            <a:r>
+              <a:rPr lang="en-US" sz="1800" b="1" dirty="0">
+                <a:latin typeface="Courier New" panose="02070309020205020404" pitchFamily="49" charset="0"/>
+                <a:cs typeface="Courier New" panose="02070309020205020404" pitchFamily="49" charset="0"/>
+              </a:rPr>
+              <a:t>. New England Journal of Medicine 336, 1401-1408.)</a:t>
             </a:r>
           </a:p>
         </p:txBody>
@@ -4328,6 +4471,3124 @@
                 <a:defRPr/>
               </a:pPr>
               <a:t>11</a:t>
+            </a:fld>
+            <a:endParaRPr lang="en-US"/>
+          </a:p>
+        </p:txBody>
+      </p:sp>
+      <p:sp>
+        <p:nvSpPr>
+          <p:cNvPr id="6" name="Text Placeholder 5"/>
+          <p:cNvSpPr>
+            <a:spLocks noGrp="1"/>
+          </p:cNvSpPr>
+          <p:nvPr>
+            <p:ph type="body" sz="quarter" idx="12"/>
+          </p:nvPr>
+        </p:nvSpPr>
+        <p:spPr/>
+        <p:txBody>
+          <a:bodyPr/>
+          <a:lstStyle/>
+          <a:p>
+            <a:r>
+              <a:rPr lang="en-US" dirty="0"/>
+              <a:t>Description</a:t>
+            </a:r>
+          </a:p>
+        </p:txBody>
+      </p:sp>
+    </p:spTree>
+    <p:extLst>
+      <p:ext uri="{BB962C8B-B14F-4D97-AF65-F5344CB8AC3E}">
+        <p14:creationId xmlns:p14="http://schemas.microsoft.com/office/powerpoint/2010/main" val="398883636"/>
+      </p:ext>
+    </p:extLst>
+  </p:cSld>
+  <p:clrMapOvr>
+    <a:masterClrMapping/>
+  </p:clrMapOvr>
+</p:sld>
+</file>
+
+<file path=ppt/slides/slide12.xml><?xml version="1.0" encoding="utf-8"?>
+<p:sld xmlns:a="http://schemas.openxmlformats.org/drawingml/2006/main" xmlns:r="http://schemas.openxmlformats.org/officeDocument/2006/relationships" xmlns:p="http://schemas.openxmlformats.org/presentationml/2006/main">
+  <p:cSld>
+    <p:spTree>
+      <p:nvGrpSpPr>
+        <p:cNvPr id="1" name=""/>
+        <p:cNvGrpSpPr/>
+        <p:nvPr/>
+      </p:nvGrpSpPr>
+      <p:grpSpPr>
+        <a:xfrm>
+          <a:off x="0" y="0"/>
+          <a:ext cx="0" cy="0"/>
+          <a:chOff x="0" y="0"/>
+          <a:chExt cx="0" cy="0"/>
+        </a:xfrm>
+      </p:grpSpPr>
+      <p:sp>
+        <p:nvSpPr>
+          <p:cNvPr id="2" name="Title 1"/>
+          <p:cNvSpPr>
+            <a:spLocks noGrp="1"/>
+          </p:cNvSpPr>
+          <p:nvPr>
+            <p:ph type="title"/>
+          </p:nvPr>
+        </p:nvSpPr>
+        <p:spPr/>
+        <p:txBody>
+          <a:bodyPr/>
+          <a:lstStyle/>
+          <a:p>
+            <a:r>
+              <a:rPr lang="en-US" dirty="0"/>
+              <a:t>Ashkenazi data set</a:t>
+            </a:r>
+          </a:p>
+        </p:txBody>
+      </p:sp>
+      <p:sp>
+        <p:nvSpPr>
+          <p:cNvPr id="3" name="Text Placeholder 2"/>
+          <p:cNvSpPr>
+            <a:spLocks noGrp="1"/>
+          </p:cNvSpPr>
+          <p:nvPr>
+            <p:ph type="body" idx="1"/>
+          </p:nvPr>
+        </p:nvSpPr>
+        <p:spPr/>
+        <p:txBody>
+          <a:bodyPr/>
+          <a:lstStyle/>
+          <a:p>
+            <a:pPr marL="285750" indent="-285750">
+              <a:buFont typeface="Arial" panose="020B0604020202020204" pitchFamily="34" charset="0"/>
+              <a:buChar char="•"/>
+            </a:pPr>
+            <a:r>
+              <a:rPr lang="en-US" sz="1800" b="1" dirty="0" err="1">
+                <a:latin typeface="Courier New" panose="02070309020205020404" pitchFamily="49" charset="0"/>
+                <a:cs typeface="Courier New" panose="02070309020205020404" pitchFamily="49" charset="0"/>
+              </a:rPr>
+              <a:t>famID</a:t>
+            </a:r>
+            <a:r>
+              <a:rPr lang="en-US" sz="1800" b="1" dirty="0">
+                <a:latin typeface="Courier New" panose="02070309020205020404" pitchFamily="49" charset="0"/>
+                <a:cs typeface="Courier New" panose="02070309020205020404" pitchFamily="49" charset="0"/>
+              </a:rPr>
+              <a:t>: family ID indicator</a:t>
+            </a:r>
+          </a:p>
+          <a:p>
+            <a:pPr marL="285750" indent="-285750">
+              <a:buFont typeface="Arial" panose="020B0604020202020204" pitchFamily="34" charset="0"/>
+              <a:buChar char="•"/>
+            </a:pPr>
+            <a:r>
+              <a:rPr lang="en-US" sz="1800" b="1" dirty="0" err="1">
+                <a:latin typeface="Courier New" panose="02070309020205020404" pitchFamily="49" charset="0"/>
+                <a:cs typeface="Courier New" panose="02070309020205020404" pitchFamily="49" charset="0"/>
+              </a:rPr>
+              <a:t>brcancer</a:t>
+            </a:r>
+            <a:r>
+              <a:rPr lang="en-US" sz="1800" b="1" dirty="0">
+                <a:latin typeface="Courier New" panose="02070309020205020404" pitchFamily="49" charset="0"/>
+                <a:cs typeface="Courier New" panose="02070309020205020404" pitchFamily="49" charset="0"/>
+              </a:rPr>
+              <a:t>: 1 if subject had breast cancer, 0 if not</a:t>
+            </a:r>
+          </a:p>
+          <a:p>
+            <a:pPr marL="285750" indent="-285750">
+              <a:buFont typeface="Arial" panose="020B0604020202020204" pitchFamily="34" charset="0"/>
+              <a:buChar char="•"/>
+            </a:pPr>
+            <a:r>
+              <a:rPr lang="en-US" sz="1800" b="1" dirty="0">
+                <a:latin typeface="Courier New" panose="02070309020205020404" pitchFamily="49" charset="0"/>
+                <a:cs typeface="Courier New" panose="02070309020205020404" pitchFamily="49" charset="0"/>
+              </a:rPr>
+              <a:t>age: Age at onset of breast cancer, or current age if no breast cancer</a:t>
+            </a:r>
+          </a:p>
+          <a:p>
+            <a:pPr marL="285750" indent="-285750">
+              <a:buFont typeface="Arial" panose="020B0604020202020204" pitchFamily="34" charset="0"/>
+              <a:buChar char="•"/>
+            </a:pPr>
+            <a:r>
+              <a:rPr lang="en-US" sz="1800" b="1" dirty="0">
+                <a:latin typeface="Courier New" panose="02070309020205020404" pitchFamily="49" charset="0"/>
+                <a:cs typeface="Courier New" panose="02070309020205020404" pitchFamily="49" charset="0"/>
+              </a:rPr>
+              <a:t>mutant: 1 if first degree relative proband was a BRCA mutation carrier, 0 if not</a:t>
+            </a:r>
+          </a:p>
+          <a:p>
+            <a:endParaRPr lang="en-US" sz="1800" b="1" dirty="0">
+              <a:latin typeface="Courier New" panose="02070309020205020404" pitchFamily="49" charset="0"/>
+              <a:cs typeface="Courier New" panose="02070309020205020404" pitchFamily="49" charset="0"/>
+            </a:endParaRPr>
+          </a:p>
+          <a:p>
+            <a:endParaRPr lang="en-US" sz="1800" b="1" dirty="0">
+              <a:latin typeface="Courier New" panose="02070309020205020404" pitchFamily="49" charset="0"/>
+              <a:cs typeface="Courier New" panose="02070309020205020404" pitchFamily="49" charset="0"/>
+            </a:endParaRPr>
+          </a:p>
+        </p:txBody>
+      </p:sp>
+      <p:sp>
+        <p:nvSpPr>
+          <p:cNvPr id="4" name="Footer Placeholder 3"/>
+          <p:cNvSpPr>
+            <a:spLocks noGrp="1"/>
+          </p:cNvSpPr>
+          <p:nvPr>
+            <p:ph type="ftr" sz="quarter" idx="10"/>
+          </p:nvPr>
+        </p:nvSpPr>
+        <p:spPr/>
+        <p:txBody>
+          <a:bodyPr/>
+          <a:lstStyle/>
+          <a:p>
+            <a:pPr>
+              <a:defRPr/>
+            </a:pPr>
+            <a:r>
+              <a:rPr lang="en-US" altLang="en-US" dirty="0"/>
+              <a:t>©2018 Steve Simon    http://TheAnalysisFactor.com</a:t>
+            </a:r>
+          </a:p>
+        </p:txBody>
+      </p:sp>
+      <p:sp>
+        <p:nvSpPr>
+          <p:cNvPr id="5" name="Slide Number Placeholder 4"/>
+          <p:cNvSpPr>
+            <a:spLocks noGrp="1"/>
+          </p:cNvSpPr>
+          <p:nvPr>
+            <p:ph type="sldNum" sz="quarter" idx="11"/>
+          </p:nvPr>
+        </p:nvSpPr>
+        <p:spPr/>
+        <p:txBody>
+          <a:bodyPr/>
+          <a:lstStyle/>
+          <a:p>
+            <a:pPr>
+              <a:defRPr/>
+            </a:pPr>
+            <a:endParaRPr lang="en-US"/>
+          </a:p>
+          <a:p>
+            <a:pPr>
+              <a:defRPr/>
+            </a:pPr>
+            <a:fld id="{E9A8CBA3-AA2B-46A6-BFA3-DCEBEAAB3F0A}" type="slidenum">
+              <a:rPr lang="en-US" smtClean="0"/>
+              <a:pPr>
+                <a:defRPr/>
+              </a:pPr>
+              <a:t>12</a:t>
+            </a:fld>
+            <a:endParaRPr lang="en-US"/>
+          </a:p>
+        </p:txBody>
+      </p:sp>
+      <p:sp>
+        <p:nvSpPr>
+          <p:cNvPr id="6" name="Text Placeholder 5"/>
+          <p:cNvSpPr>
+            <a:spLocks noGrp="1"/>
+          </p:cNvSpPr>
+          <p:nvPr>
+            <p:ph type="body" sz="quarter" idx="12"/>
+          </p:nvPr>
+        </p:nvSpPr>
+        <p:spPr/>
+        <p:txBody>
+          <a:bodyPr/>
+          <a:lstStyle/>
+          <a:p>
+            <a:r>
+              <a:rPr lang="en-US" b="1" dirty="0">
+                <a:latin typeface="Courier New" panose="02070309020205020404" pitchFamily="49" charset="0"/>
+                <a:cs typeface="Courier New" panose="02070309020205020404" pitchFamily="49" charset="0"/>
+              </a:rPr>
+              <a:t>3920 observations and 4 variables</a:t>
+            </a:r>
+            <a:endParaRPr lang="en-US" dirty="0"/>
+          </a:p>
+        </p:txBody>
+      </p:sp>
+    </p:spTree>
+    <p:extLst>
+      <p:ext uri="{BB962C8B-B14F-4D97-AF65-F5344CB8AC3E}">
+        <p14:creationId xmlns:p14="http://schemas.microsoft.com/office/powerpoint/2010/main" val="2944027875"/>
+      </p:ext>
+    </p:extLst>
+  </p:cSld>
+  <p:clrMapOvr>
+    <a:masterClrMapping/>
+  </p:clrMapOvr>
+</p:sld>
+</file>
+
+<file path=ppt/slides/slide13.xml><?xml version="1.0" encoding="utf-8"?>
+<p:sld xmlns:a="http://schemas.openxmlformats.org/drawingml/2006/main" xmlns:r="http://schemas.openxmlformats.org/officeDocument/2006/relationships" xmlns:p="http://schemas.openxmlformats.org/presentationml/2006/main">
+  <p:cSld>
+    <p:spTree>
+      <p:nvGrpSpPr>
+        <p:cNvPr id="1" name=""/>
+        <p:cNvGrpSpPr/>
+        <p:nvPr/>
+      </p:nvGrpSpPr>
+      <p:grpSpPr>
+        <a:xfrm>
+          <a:off x="0" y="0"/>
+          <a:ext cx="0" cy="0"/>
+          <a:chOff x="0" y="0"/>
+          <a:chExt cx="0" cy="0"/>
+        </a:xfrm>
+      </p:grpSpPr>
+      <p:sp>
+        <p:nvSpPr>
+          <p:cNvPr id="2" name="Title 1"/>
+          <p:cNvSpPr>
+            <a:spLocks noGrp="1"/>
+          </p:cNvSpPr>
+          <p:nvPr>
+            <p:ph type="title"/>
+          </p:nvPr>
+        </p:nvSpPr>
+        <p:spPr/>
+        <p:txBody>
+          <a:bodyPr/>
+          <a:lstStyle/>
+          <a:p>
+            <a:r>
+              <a:rPr lang="en-US" dirty="0"/>
+              <a:t>Rats data set</a:t>
+            </a:r>
+          </a:p>
+        </p:txBody>
+      </p:sp>
+      <p:sp>
+        <p:nvSpPr>
+          <p:cNvPr id="3" name="Text Placeholder 2"/>
+          <p:cNvSpPr>
+            <a:spLocks noGrp="1"/>
+          </p:cNvSpPr>
+          <p:nvPr>
+            <p:ph type="body" idx="1"/>
+          </p:nvPr>
+        </p:nvSpPr>
+        <p:spPr/>
+        <p:txBody>
+          <a:bodyPr/>
+          <a:lstStyle/>
+          <a:p>
+            <a:r>
+              <a:rPr lang="en-US" sz="1800" b="1" dirty="0">
+                <a:latin typeface="Courier New" panose="02070309020205020404" pitchFamily="49" charset="0"/>
+                <a:cs typeface="Courier New" panose="02070309020205020404" pitchFamily="49" charset="0"/>
+              </a:rPr>
+              <a:t>Rat treatment data from Mantel et al. Three rats were chosen from each of 100 litters, one of which was treated with a drug, and then all followed for tumor incidence.</a:t>
+            </a:r>
+          </a:p>
+          <a:p>
+            <a:endParaRPr lang="en-US" sz="1800" b="1" dirty="0">
+              <a:latin typeface="Courier New" panose="02070309020205020404" pitchFamily="49" charset="0"/>
+              <a:cs typeface="Courier New" panose="02070309020205020404" pitchFamily="49" charset="0"/>
+            </a:endParaRPr>
+          </a:p>
+          <a:p>
+            <a:r>
+              <a:rPr lang="en-US" sz="1800" b="1" dirty="0">
+                <a:latin typeface="Courier New" panose="02070309020205020404" pitchFamily="49" charset="0"/>
+                <a:cs typeface="Courier New" panose="02070309020205020404" pitchFamily="49" charset="0"/>
+              </a:rPr>
+              <a:t>N. Mantel, N. R. </a:t>
+            </a:r>
+            <a:r>
+              <a:rPr lang="en-US" sz="1800" b="1" dirty="0" err="1">
+                <a:latin typeface="Courier New" panose="02070309020205020404" pitchFamily="49" charset="0"/>
+                <a:cs typeface="Courier New" panose="02070309020205020404" pitchFamily="49" charset="0"/>
+              </a:rPr>
+              <a:t>Bohidar</a:t>
+            </a:r>
+            <a:r>
+              <a:rPr lang="en-US" sz="1800" b="1" dirty="0">
+                <a:latin typeface="Courier New" panose="02070309020205020404" pitchFamily="49" charset="0"/>
+                <a:cs typeface="Courier New" panose="02070309020205020404" pitchFamily="49" charset="0"/>
+              </a:rPr>
+              <a:t> and J. L. </a:t>
+            </a:r>
+            <a:r>
+              <a:rPr lang="en-US" sz="1800" b="1" dirty="0" err="1">
+                <a:latin typeface="Courier New" panose="02070309020205020404" pitchFamily="49" charset="0"/>
+                <a:cs typeface="Courier New" panose="02070309020205020404" pitchFamily="49" charset="0"/>
+              </a:rPr>
+              <a:t>Ciminera</a:t>
+            </a:r>
+            <a:r>
+              <a:rPr lang="en-US" sz="1800" b="1" dirty="0">
+                <a:latin typeface="Courier New" panose="02070309020205020404" pitchFamily="49" charset="0"/>
+                <a:cs typeface="Courier New" panose="02070309020205020404" pitchFamily="49" charset="0"/>
+              </a:rPr>
+              <a:t>. Mantel-</a:t>
+            </a:r>
+            <a:r>
+              <a:rPr lang="en-US" sz="1800" b="1" dirty="0" err="1">
+                <a:latin typeface="Courier New" panose="02070309020205020404" pitchFamily="49" charset="0"/>
+                <a:cs typeface="Courier New" panose="02070309020205020404" pitchFamily="49" charset="0"/>
+              </a:rPr>
+              <a:t>Haenszel</a:t>
+            </a:r>
+            <a:r>
+              <a:rPr lang="en-US" sz="1800" b="1" dirty="0">
+                <a:latin typeface="Courier New" panose="02070309020205020404" pitchFamily="49" charset="0"/>
+                <a:cs typeface="Courier New" panose="02070309020205020404" pitchFamily="49" charset="0"/>
+              </a:rPr>
+              <a:t> analyses of litter-matched time to response data, with modifications for recovery of </a:t>
+            </a:r>
+            <a:r>
+              <a:rPr lang="en-US" sz="1800" b="1" dirty="0" err="1">
+                <a:latin typeface="Courier New" panose="02070309020205020404" pitchFamily="49" charset="0"/>
+                <a:cs typeface="Courier New" panose="02070309020205020404" pitchFamily="49" charset="0"/>
+              </a:rPr>
+              <a:t>interlitter</a:t>
+            </a:r>
+            <a:r>
+              <a:rPr lang="en-US" sz="1800" b="1" dirty="0">
+                <a:latin typeface="Courier New" panose="02070309020205020404" pitchFamily="49" charset="0"/>
+                <a:cs typeface="Courier New" panose="02070309020205020404" pitchFamily="49" charset="0"/>
+              </a:rPr>
+              <a:t> information. Cancer Research, 37:3863-3868, 1977.</a:t>
+            </a:r>
+          </a:p>
+          <a:p>
+            <a:endParaRPr lang="en-US" sz="1800" b="1" dirty="0">
+              <a:latin typeface="Courier New" panose="02070309020205020404" pitchFamily="49" charset="0"/>
+              <a:cs typeface="Courier New" panose="02070309020205020404" pitchFamily="49" charset="0"/>
+            </a:endParaRPr>
+          </a:p>
+        </p:txBody>
+      </p:sp>
+      <p:sp>
+        <p:nvSpPr>
+          <p:cNvPr id="4" name="Footer Placeholder 3"/>
+          <p:cNvSpPr>
+            <a:spLocks noGrp="1"/>
+          </p:cNvSpPr>
+          <p:nvPr>
+            <p:ph type="ftr" sz="quarter" idx="10"/>
+          </p:nvPr>
+        </p:nvSpPr>
+        <p:spPr/>
+        <p:txBody>
+          <a:bodyPr/>
+          <a:lstStyle/>
+          <a:p>
+            <a:pPr>
+              <a:defRPr/>
+            </a:pPr>
+            <a:r>
+              <a:rPr lang="en-US" altLang="en-US" dirty="0"/>
+              <a:t>©2018 Steve Simon    http://TheAnalysisFactor.com</a:t>
+            </a:r>
+          </a:p>
+        </p:txBody>
+      </p:sp>
+      <p:sp>
+        <p:nvSpPr>
+          <p:cNvPr id="5" name="Slide Number Placeholder 4"/>
+          <p:cNvSpPr>
+            <a:spLocks noGrp="1"/>
+          </p:cNvSpPr>
+          <p:nvPr>
+            <p:ph type="sldNum" sz="quarter" idx="11"/>
+          </p:nvPr>
+        </p:nvSpPr>
+        <p:spPr/>
+        <p:txBody>
+          <a:bodyPr/>
+          <a:lstStyle/>
+          <a:p>
+            <a:pPr>
+              <a:defRPr/>
+            </a:pPr>
+            <a:endParaRPr lang="en-US"/>
+          </a:p>
+          <a:p>
+            <a:pPr>
+              <a:defRPr/>
+            </a:pPr>
+            <a:fld id="{E9A8CBA3-AA2B-46A6-BFA3-DCEBEAAB3F0A}" type="slidenum">
+              <a:rPr lang="en-US" smtClean="0"/>
+              <a:pPr>
+                <a:defRPr/>
+              </a:pPr>
+              <a:t>13</a:t>
+            </a:fld>
+            <a:endParaRPr lang="en-US"/>
+          </a:p>
+        </p:txBody>
+      </p:sp>
+      <p:sp>
+        <p:nvSpPr>
+          <p:cNvPr id="6" name="Text Placeholder 5"/>
+          <p:cNvSpPr>
+            <a:spLocks noGrp="1"/>
+          </p:cNvSpPr>
+          <p:nvPr>
+            <p:ph type="body" sz="quarter" idx="12"/>
+          </p:nvPr>
+        </p:nvSpPr>
+        <p:spPr/>
+        <p:txBody>
+          <a:bodyPr/>
+          <a:lstStyle/>
+          <a:p>
+            <a:r>
+              <a:rPr lang="en-US" b="1" dirty="0">
+                <a:latin typeface="Courier New" panose="02070309020205020404" pitchFamily="49" charset="0"/>
+                <a:cs typeface="Courier New" panose="02070309020205020404" pitchFamily="49" charset="0"/>
+              </a:rPr>
+              <a:t>Description</a:t>
+            </a:r>
+            <a:endParaRPr lang="en-US" dirty="0"/>
+          </a:p>
+        </p:txBody>
+      </p:sp>
+    </p:spTree>
+    <p:extLst>
+      <p:ext uri="{BB962C8B-B14F-4D97-AF65-F5344CB8AC3E}">
+        <p14:creationId xmlns:p14="http://schemas.microsoft.com/office/powerpoint/2010/main" val="1425889960"/>
+      </p:ext>
+    </p:extLst>
+  </p:cSld>
+  <p:clrMapOvr>
+    <a:masterClrMapping/>
+  </p:clrMapOvr>
+</p:sld>
+</file>
+
+<file path=ppt/slides/slide14.xml><?xml version="1.0" encoding="utf-8"?>
+<p:sld xmlns:a="http://schemas.openxmlformats.org/drawingml/2006/main" xmlns:r="http://schemas.openxmlformats.org/officeDocument/2006/relationships" xmlns:p="http://schemas.openxmlformats.org/presentationml/2006/main">
+  <p:cSld>
+    <p:spTree>
+      <p:nvGrpSpPr>
+        <p:cNvPr id="1" name=""/>
+        <p:cNvGrpSpPr/>
+        <p:nvPr/>
+      </p:nvGrpSpPr>
+      <p:grpSpPr>
+        <a:xfrm>
+          <a:off x="0" y="0"/>
+          <a:ext cx="0" cy="0"/>
+          <a:chOff x="0" y="0"/>
+          <a:chExt cx="0" cy="0"/>
+        </a:xfrm>
+      </p:grpSpPr>
+      <p:sp>
+        <p:nvSpPr>
+          <p:cNvPr id="2" name="Title 1"/>
+          <p:cNvSpPr>
+            <a:spLocks noGrp="1"/>
+          </p:cNvSpPr>
+          <p:nvPr>
+            <p:ph type="title"/>
+          </p:nvPr>
+        </p:nvSpPr>
+        <p:spPr/>
+        <p:txBody>
+          <a:bodyPr/>
+          <a:lstStyle/>
+          <a:p>
+            <a:r>
+              <a:rPr lang="en-US" dirty="0"/>
+              <a:t>Rats data set</a:t>
+            </a:r>
+          </a:p>
+        </p:txBody>
+      </p:sp>
+      <p:sp>
+        <p:nvSpPr>
+          <p:cNvPr id="3" name="Text Placeholder 2"/>
+          <p:cNvSpPr>
+            <a:spLocks noGrp="1"/>
+          </p:cNvSpPr>
+          <p:nvPr>
+            <p:ph type="body" idx="1"/>
+          </p:nvPr>
+        </p:nvSpPr>
+        <p:spPr/>
+        <p:txBody>
+          <a:bodyPr/>
+          <a:lstStyle/>
+          <a:p>
+            <a:pPr marL="285750" indent="-285750">
+              <a:buFont typeface="Arial" panose="020B0604020202020204" pitchFamily="34" charset="0"/>
+              <a:buChar char="•"/>
+            </a:pPr>
+            <a:r>
+              <a:rPr lang="en-US" sz="1800" b="1" dirty="0">
+                <a:latin typeface="Courier New" panose="02070309020205020404" pitchFamily="49" charset="0"/>
+                <a:cs typeface="Courier New" panose="02070309020205020404" pitchFamily="49" charset="0"/>
+              </a:rPr>
+              <a:t>litter: litter number from 1 to 100</a:t>
+            </a:r>
+          </a:p>
+          <a:p>
+            <a:pPr marL="285750" indent="-285750">
+              <a:buFont typeface="Arial" panose="020B0604020202020204" pitchFamily="34" charset="0"/>
+              <a:buChar char="•"/>
+            </a:pPr>
+            <a:r>
+              <a:rPr lang="en-US" sz="1800" b="1" dirty="0" err="1">
+                <a:latin typeface="Courier New" panose="02070309020205020404" pitchFamily="49" charset="0"/>
+                <a:cs typeface="Courier New" panose="02070309020205020404" pitchFamily="49" charset="0"/>
+              </a:rPr>
+              <a:t>rx</a:t>
+            </a:r>
+            <a:r>
+              <a:rPr lang="en-US" sz="1800" b="1" dirty="0">
+                <a:latin typeface="Courier New" panose="02070309020205020404" pitchFamily="49" charset="0"/>
+                <a:cs typeface="Courier New" panose="02070309020205020404" pitchFamily="49" charset="0"/>
+              </a:rPr>
+              <a:t>: treatment,(1=drug, 0=control)</a:t>
+            </a:r>
+          </a:p>
+          <a:p>
+            <a:pPr marL="285750" indent="-285750">
+              <a:buFont typeface="Arial" panose="020B0604020202020204" pitchFamily="34" charset="0"/>
+              <a:buChar char="•"/>
+            </a:pPr>
+            <a:r>
+              <a:rPr lang="en-US" sz="1800" b="1" dirty="0">
+                <a:latin typeface="Courier New" panose="02070309020205020404" pitchFamily="49" charset="0"/>
+                <a:cs typeface="Courier New" panose="02070309020205020404" pitchFamily="49" charset="0"/>
+              </a:rPr>
+              <a:t>time: time to tumor or last follow-up</a:t>
+            </a:r>
+          </a:p>
+          <a:p>
+            <a:pPr marL="285750" indent="-285750">
+              <a:buFont typeface="Arial" panose="020B0604020202020204" pitchFamily="34" charset="0"/>
+              <a:buChar char="•"/>
+            </a:pPr>
+            <a:r>
+              <a:rPr lang="en-US" sz="1800" b="1" dirty="0">
+                <a:latin typeface="Courier New" panose="02070309020205020404" pitchFamily="49" charset="0"/>
+                <a:cs typeface="Courier New" panose="02070309020205020404" pitchFamily="49" charset="0"/>
+              </a:rPr>
+              <a:t>status: event status, 1=tumor and 0=censored</a:t>
+            </a:r>
+          </a:p>
+          <a:p>
+            <a:pPr marL="285750" indent="-285750">
+              <a:buFont typeface="Arial" panose="020B0604020202020204" pitchFamily="34" charset="0"/>
+              <a:buChar char="•"/>
+            </a:pPr>
+            <a:r>
+              <a:rPr lang="en-US" sz="1800" b="1" dirty="0">
+                <a:latin typeface="Courier New" panose="02070309020205020404" pitchFamily="49" charset="0"/>
+                <a:cs typeface="Courier New" panose="02070309020205020404" pitchFamily="49" charset="0"/>
+              </a:rPr>
+              <a:t>sex: male or female</a:t>
+            </a:r>
+          </a:p>
+        </p:txBody>
+      </p:sp>
+      <p:sp>
+        <p:nvSpPr>
+          <p:cNvPr id="4" name="Footer Placeholder 3"/>
+          <p:cNvSpPr>
+            <a:spLocks noGrp="1"/>
+          </p:cNvSpPr>
+          <p:nvPr>
+            <p:ph type="ftr" sz="quarter" idx="10"/>
+          </p:nvPr>
+        </p:nvSpPr>
+        <p:spPr/>
+        <p:txBody>
+          <a:bodyPr/>
+          <a:lstStyle/>
+          <a:p>
+            <a:pPr>
+              <a:defRPr/>
+            </a:pPr>
+            <a:r>
+              <a:rPr lang="en-US" altLang="en-US" dirty="0"/>
+              <a:t>©2018 Steve Simon    http://TheAnalysisFactor.com</a:t>
+            </a:r>
+          </a:p>
+        </p:txBody>
+      </p:sp>
+      <p:sp>
+        <p:nvSpPr>
+          <p:cNvPr id="5" name="Slide Number Placeholder 4"/>
+          <p:cNvSpPr>
+            <a:spLocks noGrp="1"/>
+          </p:cNvSpPr>
+          <p:nvPr>
+            <p:ph type="sldNum" sz="quarter" idx="11"/>
+          </p:nvPr>
+        </p:nvSpPr>
+        <p:spPr/>
+        <p:txBody>
+          <a:bodyPr/>
+          <a:lstStyle/>
+          <a:p>
+            <a:pPr>
+              <a:defRPr/>
+            </a:pPr>
+            <a:endParaRPr lang="en-US"/>
+          </a:p>
+          <a:p>
+            <a:pPr>
+              <a:defRPr/>
+            </a:pPr>
+            <a:fld id="{E9A8CBA3-AA2B-46A6-BFA3-DCEBEAAB3F0A}" type="slidenum">
+              <a:rPr lang="en-US" smtClean="0"/>
+              <a:pPr>
+                <a:defRPr/>
+              </a:pPr>
+              <a:t>14</a:t>
+            </a:fld>
+            <a:endParaRPr lang="en-US"/>
+          </a:p>
+        </p:txBody>
+      </p:sp>
+      <p:sp>
+        <p:nvSpPr>
+          <p:cNvPr id="6" name="Text Placeholder 5"/>
+          <p:cNvSpPr>
+            <a:spLocks noGrp="1"/>
+          </p:cNvSpPr>
+          <p:nvPr>
+            <p:ph type="body" sz="quarter" idx="12"/>
+          </p:nvPr>
+        </p:nvSpPr>
+        <p:spPr/>
+        <p:txBody>
+          <a:bodyPr/>
+          <a:lstStyle/>
+          <a:p>
+            <a:r>
+              <a:rPr lang="en-US" b="1" dirty="0">
+                <a:latin typeface="Courier New" panose="02070309020205020404" pitchFamily="49" charset="0"/>
+                <a:cs typeface="Courier New" panose="02070309020205020404" pitchFamily="49" charset="0"/>
+              </a:rPr>
+              <a:t>300 observations and 5 variables.</a:t>
+            </a:r>
+            <a:endParaRPr lang="en-US" dirty="0"/>
+          </a:p>
+        </p:txBody>
+      </p:sp>
+    </p:spTree>
+    <p:extLst>
+      <p:ext uri="{BB962C8B-B14F-4D97-AF65-F5344CB8AC3E}">
+        <p14:creationId xmlns:p14="http://schemas.microsoft.com/office/powerpoint/2010/main" val="3127566953"/>
+      </p:ext>
+    </p:extLst>
+  </p:cSld>
+  <p:clrMapOvr>
+    <a:masterClrMapping/>
+  </p:clrMapOvr>
+</p:sld>
+</file>
+
+<file path=ppt/slides/slide15.xml><?xml version="1.0" encoding="utf-8"?>
+<p:sld xmlns:a="http://schemas.openxmlformats.org/drawingml/2006/main" xmlns:r="http://schemas.openxmlformats.org/officeDocument/2006/relationships" xmlns:p="http://schemas.openxmlformats.org/presentationml/2006/main">
+  <p:cSld>
+    <p:spTree>
+      <p:nvGrpSpPr>
+        <p:cNvPr id="1" name=""/>
+        <p:cNvGrpSpPr/>
+        <p:nvPr/>
+      </p:nvGrpSpPr>
+      <p:grpSpPr>
+        <a:xfrm>
+          <a:off x="0" y="0"/>
+          <a:ext cx="0" cy="0"/>
+          <a:chOff x="0" y="0"/>
+          <a:chExt cx="0" cy="0"/>
+        </a:xfrm>
+      </p:grpSpPr>
+      <p:sp>
+        <p:nvSpPr>
+          <p:cNvPr id="2" name="Title 1"/>
+          <p:cNvSpPr>
+            <a:spLocks noGrp="1"/>
+          </p:cNvSpPr>
+          <p:nvPr>
+            <p:ph type="title"/>
+          </p:nvPr>
+        </p:nvSpPr>
+        <p:spPr/>
+        <p:txBody>
+          <a:bodyPr/>
+          <a:lstStyle/>
+          <a:p>
+            <a:r>
+              <a:rPr lang="en-US" dirty="0"/>
+              <a:t>Diabetes data set</a:t>
+            </a:r>
+          </a:p>
+        </p:txBody>
+      </p:sp>
+      <p:sp>
+        <p:nvSpPr>
+          <p:cNvPr id="3" name="Text Placeholder 2"/>
+          <p:cNvSpPr>
+            <a:spLocks noGrp="1"/>
+          </p:cNvSpPr>
+          <p:nvPr>
+            <p:ph type="body" idx="1"/>
+          </p:nvPr>
+        </p:nvSpPr>
+        <p:spPr/>
+        <p:txBody>
+          <a:bodyPr/>
+          <a:lstStyle/>
+          <a:p>
+            <a:r>
+              <a:rPr lang="en-US" sz="1800" b="1" dirty="0">
+                <a:latin typeface="Courier New" panose="02070309020205020404" pitchFamily="49" charset="0"/>
+                <a:cs typeface="Courier New" panose="02070309020205020404" pitchFamily="49" charset="0"/>
+              </a:rPr>
+              <a:t>The data was </a:t>
+            </a:r>
+            <a:r>
+              <a:rPr lang="en-US" sz="1800" b="1" dirty="0" err="1">
+                <a:latin typeface="Courier New" panose="02070309020205020404" pitchFamily="49" charset="0"/>
+                <a:cs typeface="Courier New" panose="02070309020205020404" pitchFamily="49" charset="0"/>
+              </a:rPr>
+              <a:t>colleceted</a:t>
+            </a:r>
+            <a:r>
+              <a:rPr lang="en-US" sz="1800" b="1" dirty="0">
+                <a:latin typeface="Courier New" panose="02070309020205020404" pitchFamily="49" charset="0"/>
+                <a:cs typeface="Courier New" panose="02070309020205020404" pitchFamily="49" charset="0"/>
+              </a:rPr>
+              <a:t> to test a laser treatment for delaying blindness in patients with </a:t>
+            </a:r>
+            <a:r>
+              <a:rPr lang="en-US" sz="1800" b="1" dirty="0" err="1">
+                <a:latin typeface="Courier New" panose="02070309020205020404" pitchFamily="49" charset="0"/>
+                <a:cs typeface="Courier New" panose="02070309020205020404" pitchFamily="49" charset="0"/>
+              </a:rPr>
+              <a:t>dibetic</a:t>
+            </a:r>
+            <a:r>
+              <a:rPr lang="en-US" sz="1800" b="1" dirty="0">
+                <a:latin typeface="Courier New" panose="02070309020205020404" pitchFamily="49" charset="0"/>
+                <a:cs typeface="Courier New" panose="02070309020205020404" pitchFamily="49" charset="0"/>
+              </a:rPr>
+              <a:t> retinopathy. The subset of 197 </a:t>
+            </a:r>
+            <a:r>
+              <a:rPr lang="en-US" sz="1800" b="1" dirty="0" err="1">
+                <a:latin typeface="Courier New" panose="02070309020205020404" pitchFamily="49" charset="0"/>
+                <a:cs typeface="Courier New" panose="02070309020205020404" pitchFamily="49" charset="0"/>
+              </a:rPr>
+              <a:t>patiens</a:t>
+            </a:r>
+            <a:r>
+              <a:rPr lang="en-US" sz="1800" b="1" dirty="0">
+                <a:latin typeface="Courier New" panose="02070309020205020404" pitchFamily="49" charset="0"/>
+                <a:cs typeface="Courier New" panose="02070309020205020404" pitchFamily="49" charset="0"/>
+              </a:rPr>
+              <a:t> given in </a:t>
+            </a:r>
+            <a:r>
+              <a:rPr lang="en-US" sz="1800" b="1" dirty="0" err="1">
+                <a:latin typeface="Courier New" panose="02070309020205020404" pitchFamily="49" charset="0"/>
+                <a:cs typeface="Courier New" panose="02070309020205020404" pitchFamily="49" charset="0"/>
+              </a:rPr>
+              <a:t>Huster</a:t>
+            </a:r>
+            <a:r>
+              <a:rPr lang="en-US" sz="1800" b="1" dirty="0">
+                <a:latin typeface="Courier New" panose="02070309020205020404" pitchFamily="49" charset="0"/>
+                <a:cs typeface="Courier New" panose="02070309020205020404" pitchFamily="49" charset="0"/>
+              </a:rPr>
+              <a:t> et al. (1989) is used.</a:t>
+            </a:r>
+          </a:p>
+          <a:p>
+            <a:endParaRPr lang="en-US" sz="1800" b="1" dirty="0">
+              <a:latin typeface="Courier New" panose="02070309020205020404" pitchFamily="49" charset="0"/>
+              <a:cs typeface="Courier New" panose="02070309020205020404" pitchFamily="49" charset="0"/>
+            </a:endParaRPr>
+          </a:p>
+          <a:p>
+            <a:r>
+              <a:rPr lang="en-US" sz="1800" b="1" dirty="0" err="1">
+                <a:latin typeface="Courier New" panose="02070309020205020404" pitchFamily="49" charset="0"/>
+                <a:cs typeface="Courier New" panose="02070309020205020404" pitchFamily="49" charset="0"/>
+              </a:rPr>
+              <a:t>Huster</a:t>
+            </a:r>
+            <a:r>
+              <a:rPr lang="en-US" sz="1800" b="1" dirty="0">
+                <a:latin typeface="Courier New" panose="02070309020205020404" pitchFamily="49" charset="0"/>
+                <a:cs typeface="Courier New" panose="02070309020205020404" pitchFamily="49" charset="0"/>
+              </a:rPr>
+              <a:t> W.J. and Brookmeyer, R. and Self. S. (1989) </a:t>
+            </a:r>
+            <a:r>
+              <a:rPr lang="en-US" sz="1800" b="1" dirty="0" err="1">
+                <a:latin typeface="Courier New" panose="02070309020205020404" pitchFamily="49" charset="0"/>
+                <a:cs typeface="Courier New" panose="02070309020205020404" pitchFamily="49" charset="0"/>
+              </a:rPr>
+              <a:t>MOdelling</a:t>
+            </a:r>
+            <a:r>
+              <a:rPr lang="en-US" sz="1800" b="1" dirty="0">
+                <a:latin typeface="Courier New" panose="02070309020205020404" pitchFamily="49" charset="0"/>
+                <a:cs typeface="Courier New" panose="02070309020205020404" pitchFamily="49" charset="0"/>
+              </a:rPr>
+              <a:t> paired survival data with covariates, Biometrics 45, 145-56.</a:t>
+            </a:r>
+          </a:p>
+        </p:txBody>
+      </p:sp>
+      <p:sp>
+        <p:nvSpPr>
+          <p:cNvPr id="4" name="Footer Placeholder 3"/>
+          <p:cNvSpPr>
+            <a:spLocks noGrp="1"/>
+          </p:cNvSpPr>
+          <p:nvPr>
+            <p:ph type="ftr" sz="quarter" idx="10"/>
+          </p:nvPr>
+        </p:nvSpPr>
+        <p:spPr/>
+        <p:txBody>
+          <a:bodyPr/>
+          <a:lstStyle/>
+          <a:p>
+            <a:pPr>
+              <a:defRPr/>
+            </a:pPr>
+            <a:r>
+              <a:rPr lang="en-US" altLang="en-US" dirty="0"/>
+              <a:t>©2018 Steve Simon    http://TheAnalysisFactor.com</a:t>
+            </a:r>
+          </a:p>
+        </p:txBody>
+      </p:sp>
+      <p:sp>
+        <p:nvSpPr>
+          <p:cNvPr id="5" name="Slide Number Placeholder 4"/>
+          <p:cNvSpPr>
+            <a:spLocks noGrp="1"/>
+          </p:cNvSpPr>
+          <p:nvPr>
+            <p:ph type="sldNum" sz="quarter" idx="11"/>
+          </p:nvPr>
+        </p:nvSpPr>
+        <p:spPr/>
+        <p:txBody>
+          <a:bodyPr/>
+          <a:lstStyle/>
+          <a:p>
+            <a:pPr>
+              <a:defRPr/>
+            </a:pPr>
+            <a:endParaRPr lang="en-US"/>
+          </a:p>
+          <a:p>
+            <a:pPr>
+              <a:defRPr/>
+            </a:pPr>
+            <a:fld id="{E9A8CBA3-AA2B-46A6-BFA3-DCEBEAAB3F0A}" type="slidenum">
+              <a:rPr lang="en-US" smtClean="0"/>
+              <a:pPr>
+                <a:defRPr/>
+              </a:pPr>
+              <a:t>15</a:t>
+            </a:fld>
+            <a:endParaRPr lang="en-US"/>
+          </a:p>
+        </p:txBody>
+      </p:sp>
+      <p:sp>
+        <p:nvSpPr>
+          <p:cNvPr id="6" name="Text Placeholder 5"/>
+          <p:cNvSpPr>
+            <a:spLocks noGrp="1"/>
+          </p:cNvSpPr>
+          <p:nvPr>
+            <p:ph type="body" sz="quarter" idx="12"/>
+          </p:nvPr>
+        </p:nvSpPr>
+        <p:spPr/>
+        <p:txBody>
+          <a:bodyPr/>
+          <a:lstStyle/>
+          <a:p>
+            <a:r>
+              <a:rPr lang="en-US" b="1" dirty="0">
+                <a:latin typeface="Courier New" panose="02070309020205020404" pitchFamily="49" charset="0"/>
+                <a:cs typeface="Courier New" panose="02070309020205020404" pitchFamily="49" charset="0"/>
+              </a:rPr>
+              <a:t>Description</a:t>
+            </a:r>
+            <a:endParaRPr lang="en-US" dirty="0"/>
+          </a:p>
+        </p:txBody>
+      </p:sp>
+    </p:spTree>
+    <p:extLst>
+      <p:ext uri="{BB962C8B-B14F-4D97-AF65-F5344CB8AC3E}">
+        <p14:creationId xmlns:p14="http://schemas.microsoft.com/office/powerpoint/2010/main" val="3095013022"/>
+      </p:ext>
+    </p:extLst>
+  </p:cSld>
+  <p:clrMapOvr>
+    <a:masterClrMapping/>
+  </p:clrMapOvr>
+</p:sld>
+</file>
+
+<file path=ppt/slides/slide16.xml><?xml version="1.0" encoding="utf-8"?>
+<p:sld xmlns:a="http://schemas.openxmlformats.org/drawingml/2006/main" xmlns:r="http://schemas.openxmlformats.org/officeDocument/2006/relationships" xmlns:p="http://schemas.openxmlformats.org/presentationml/2006/main">
+  <p:cSld>
+    <p:spTree>
+      <p:nvGrpSpPr>
+        <p:cNvPr id="1" name=""/>
+        <p:cNvGrpSpPr/>
+        <p:nvPr/>
+      </p:nvGrpSpPr>
+      <p:grpSpPr>
+        <a:xfrm>
+          <a:off x="0" y="0"/>
+          <a:ext cx="0" cy="0"/>
+          <a:chOff x="0" y="0"/>
+          <a:chExt cx="0" cy="0"/>
+        </a:xfrm>
+      </p:grpSpPr>
+      <p:sp>
+        <p:nvSpPr>
+          <p:cNvPr id="2" name="Title 1"/>
+          <p:cNvSpPr>
+            <a:spLocks noGrp="1"/>
+          </p:cNvSpPr>
+          <p:nvPr>
+            <p:ph type="title"/>
+          </p:nvPr>
+        </p:nvSpPr>
+        <p:spPr/>
+        <p:txBody>
+          <a:bodyPr/>
+          <a:lstStyle/>
+          <a:p>
+            <a:r>
+              <a:rPr lang="en-US" dirty="0"/>
+              <a:t>Diabetes data set</a:t>
+            </a:r>
+          </a:p>
+        </p:txBody>
+      </p:sp>
+      <p:sp>
+        <p:nvSpPr>
+          <p:cNvPr id="3" name="Text Placeholder 2"/>
+          <p:cNvSpPr>
+            <a:spLocks noGrp="1"/>
+          </p:cNvSpPr>
+          <p:nvPr>
+            <p:ph type="body" idx="1"/>
+          </p:nvPr>
+        </p:nvSpPr>
+        <p:spPr/>
+        <p:txBody>
+          <a:bodyPr/>
+          <a:lstStyle/>
+          <a:p>
+            <a:pPr marL="285750" indent="-285750">
+              <a:buFont typeface="Arial" panose="020B0604020202020204" pitchFamily="34" charset="0"/>
+              <a:buChar char="•"/>
+            </a:pPr>
+            <a:r>
+              <a:rPr lang="en-US" sz="1800" b="1" dirty="0">
+                <a:latin typeface="Courier New" panose="02070309020205020404" pitchFamily="49" charset="0"/>
+                <a:cs typeface="Courier New" panose="02070309020205020404" pitchFamily="49" charset="0"/>
+              </a:rPr>
+              <a:t>id: a numeric vector. Patient code.</a:t>
+            </a:r>
+          </a:p>
+          <a:p>
+            <a:pPr marL="285750" indent="-285750">
+              <a:buFont typeface="Arial" panose="020B0604020202020204" pitchFamily="34" charset="0"/>
+              <a:buChar char="•"/>
+            </a:pPr>
+            <a:r>
+              <a:rPr lang="en-US" sz="1800" b="1" dirty="0" err="1">
+                <a:latin typeface="Courier New" panose="02070309020205020404" pitchFamily="49" charset="0"/>
+                <a:cs typeface="Courier New" panose="02070309020205020404" pitchFamily="49" charset="0"/>
+              </a:rPr>
+              <a:t>agedx</a:t>
+            </a:r>
+            <a:r>
+              <a:rPr lang="en-US" sz="1800" b="1" dirty="0">
+                <a:latin typeface="Courier New" panose="02070309020205020404" pitchFamily="49" charset="0"/>
+                <a:cs typeface="Courier New" panose="02070309020205020404" pitchFamily="49" charset="0"/>
+              </a:rPr>
+              <a:t>: a numeric vector. Age of patient at diagnosis.</a:t>
+            </a:r>
+          </a:p>
+          <a:p>
+            <a:pPr marL="285750" indent="-285750">
+              <a:buFont typeface="Arial" panose="020B0604020202020204" pitchFamily="34" charset="0"/>
+              <a:buChar char="•"/>
+            </a:pPr>
+            <a:r>
+              <a:rPr lang="en-US" sz="1800" b="1" dirty="0">
+                <a:latin typeface="Courier New" panose="02070309020205020404" pitchFamily="49" charset="0"/>
+                <a:cs typeface="Courier New" panose="02070309020205020404" pitchFamily="49" charset="0"/>
+              </a:rPr>
+              <a:t>time: a numeric vector. Survival time: time to blindness or censoring.</a:t>
+            </a:r>
+          </a:p>
+          <a:p>
+            <a:pPr marL="285750" indent="-285750">
+              <a:buFont typeface="Arial" panose="020B0604020202020204" pitchFamily="34" charset="0"/>
+              <a:buChar char="•"/>
+            </a:pPr>
+            <a:r>
+              <a:rPr lang="en-US" sz="1800" b="1" dirty="0">
+                <a:latin typeface="Courier New" panose="02070309020205020404" pitchFamily="49" charset="0"/>
+                <a:cs typeface="Courier New" panose="02070309020205020404" pitchFamily="49" charset="0"/>
+              </a:rPr>
+              <a:t>status: a numeric vector code. Survival status. 1: blindness, 0: censored.</a:t>
+            </a:r>
+          </a:p>
+          <a:p>
+            <a:pPr marL="285750" indent="-285750">
+              <a:buFont typeface="Arial" panose="020B0604020202020204" pitchFamily="34" charset="0"/>
+              <a:buChar char="•"/>
+            </a:pPr>
+            <a:r>
+              <a:rPr lang="en-US" sz="1800" b="1" dirty="0" err="1">
+                <a:latin typeface="Courier New" panose="02070309020205020404" pitchFamily="49" charset="0"/>
+                <a:cs typeface="Courier New" panose="02070309020205020404" pitchFamily="49" charset="0"/>
+              </a:rPr>
+              <a:t>trteye</a:t>
+            </a:r>
+            <a:r>
+              <a:rPr lang="en-US" sz="1800" b="1" dirty="0">
+                <a:latin typeface="Courier New" panose="02070309020205020404" pitchFamily="49" charset="0"/>
+                <a:cs typeface="Courier New" panose="02070309020205020404" pitchFamily="49" charset="0"/>
+              </a:rPr>
+              <a:t>: a numeric vector code. Random eye selected for treatment. 1: left eye 2: right eye.</a:t>
+            </a:r>
+          </a:p>
+          <a:p>
+            <a:pPr marL="285750" indent="-285750">
+              <a:buFont typeface="Arial" panose="020B0604020202020204" pitchFamily="34" charset="0"/>
+              <a:buChar char="•"/>
+            </a:pPr>
+            <a:r>
+              <a:rPr lang="en-US" sz="1800" b="1" dirty="0">
+                <a:latin typeface="Courier New" panose="02070309020205020404" pitchFamily="49" charset="0"/>
+                <a:cs typeface="Courier New" panose="02070309020205020404" pitchFamily="49" charset="0"/>
+              </a:rPr>
+              <a:t>treat: a numeric vector. 1: treatment 0: untreated.</a:t>
+            </a:r>
+          </a:p>
+          <a:p>
+            <a:pPr marL="285750" indent="-285750">
+              <a:buFont typeface="Arial" panose="020B0604020202020204" pitchFamily="34" charset="0"/>
+              <a:buChar char="•"/>
+            </a:pPr>
+            <a:r>
+              <a:rPr lang="en-US" sz="1800" b="1" dirty="0">
+                <a:latin typeface="Courier New" panose="02070309020205020404" pitchFamily="49" charset="0"/>
+                <a:cs typeface="Courier New" panose="02070309020205020404" pitchFamily="49" charset="0"/>
+              </a:rPr>
+              <a:t>adult: a numeric vector code. 1: younger than 20, 2: older than 20.</a:t>
+            </a:r>
+          </a:p>
+        </p:txBody>
+      </p:sp>
+      <p:sp>
+        <p:nvSpPr>
+          <p:cNvPr id="4" name="Footer Placeholder 3"/>
+          <p:cNvSpPr>
+            <a:spLocks noGrp="1"/>
+          </p:cNvSpPr>
+          <p:nvPr>
+            <p:ph type="ftr" sz="quarter" idx="10"/>
+          </p:nvPr>
+        </p:nvSpPr>
+        <p:spPr/>
+        <p:txBody>
+          <a:bodyPr/>
+          <a:lstStyle/>
+          <a:p>
+            <a:pPr>
+              <a:defRPr/>
+            </a:pPr>
+            <a:r>
+              <a:rPr lang="en-US" altLang="en-US" dirty="0"/>
+              <a:t>©2018 Steve Simon    http://TheAnalysisFactor.com</a:t>
+            </a:r>
+          </a:p>
+        </p:txBody>
+      </p:sp>
+      <p:sp>
+        <p:nvSpPr>
+          <p:cNvPr id="5" name="Slide Number Placeholder 4"/>
+          <p:cNvSpPr>
+            <a:spLocks noGrp="1"/>
+          </p:cNvSpPr>
+          <p:nvPr>
+            <p:ph type="sldNum" sz="quarter" idx="11"/>
+          </p:nvPr>
+        </p:nvSpPr>
+        <p:spPr/>
+        <p:txBody>
+          <a:bodyPr/>
+          <a:lstStyle/>
+          <a:p>
+            <a:pPr>
+              <a:defRPr/>
+            </a:pPr>
+            <a:endParaRPr lang="en-US"/>
+          </a:p>
+          <a:p>
+            <a:pPr>
+              <a:defRPr/>
+            </a:pPr>
+            <a:fld id="{E9A8CBA3-AA2B-46A6-BFA3-DCEBEAAB3F0A}" type="slidenum">
+              <a:rPr lang="en-US" smtClean="0"/>
+              <a:pPr>
+                <a:defRPr/>
+              </a:pPr>
+              <a:t>16</a:t>
+            </a:fld>
+            <a:endParaRPr lang="en-US"/>
+          </a:p>
+        </p:txBody>
+      </p:sp>
+      <p:sp>
+        <p:nvSpPr>
+          <p:cNvPr id="6" name="Text Placeholder 5"/>
+          <p:cNvSpPr>
+            <a:spLocks noGrp="1"/>
+          </p:cNvSpPr>
+          <p:nvPr>
+            <p:ph type="body" sz="quarter" idx="12"/>
+          </p:nvPr>
+        </p:nvSpPr>
+        <p:spPr/>
+        <p:txBody>
+          <a:bodyPr/>
+          <a:lstStyle/>
+          <a:p>
+            <a:r>
+              <a:rPr lang="en-US" b="1" dirty="0">
+                <a:latin typeface="Courier New" panose="02070309020205020404" pitchFamily="49" charset="0"/>
+                <a:cs typeface="Courier New" panose="02070309020205020404" pitchFamily="49" charset="0"/>
+              </a:rPr>
+              <a:t>394 observations and 7 variables.</a:t>
+            </a:r>
+            <a:endParaRPr lang="en-US" dirty="0"/>
+          </a:p>
+        </p:txBody>
+      </p:sp>
+    </p:spTree>
+    <p:extLst>
+      <p:ext uri="{BB962C8B-B14F-4D97-AF65-F5344CB8AC3E}">
+        <p14:creationId xmlns:p14="http://schemas.microsoft.com/office/powerpoint/2010/main" val="2239621086"/>
+      </p:ext>
+    </p:extLst>
+  </p:cSld>
+  <p:clrMapOvr>
+    <a:masterClrMapping/>
+  </p:clrMapOvr>
+</p:sld>
+</file>
+
+<file path=ppt/slides/slide17.xml><?xml version="1.0" encoding="utf-8"?>
+<p:sld xmlns:a="http://schemas.openxmlformats.org/drawingml/2006/main" xmlns:r="http://schemas.openxmlformats.org/officeDocument/2006/relationships" xmlns:p="http://schemas.openxmlformats.org/presentationml/2006/main">
+  <p:cSld>
+    <p:spTree>
+      <p:nvGrpSpPr>
+        <p:cNvPr id="1" name=""/>
+        <p:cNvGrpSpPr/>
+        <p:nvPr/>
+      </p:nvGrpSpPr>
+      <p:grpSpPr>
+        <a:xfrm>
+          <a:off x="0" y="0"/>
+          <a:ext cx="0" cy="0"/>
+          <a:chOff x="0" y="0"/>
+          <a:chExt cx="0" cy="0"/>
+        </a:xfrm>
+      </p:grpSpPr>
+      <p:sp>
+        <p:nvSpPr>
+          <p:cNvPr id="2" name="Title 1"/>
+          <p:cNvSpPr>
+            <a:spLocks noGrp="1"/>
+          </p:cNvSpPr>
+          <p:nvPr>
+            <p:ph type="title"/>
+          </p:nvPr>
+        </p:nvSpPr>
+        <p:spPr/>
+        <p:txBody>
+          <a:bodyPr/>
+          <a:lstStyle/>
+          <a:p>
+            <a:r>
+              <a:rPr lang="en-US" dirty="0"/>
+              <a:t>Kidney data set</a:t>
+            </a:r>
+          </a:p>
+        </p:txBody>
+      </p:sp>
+      <p:sp>
+        <p:nvSpPr>
+          <p:cNvPr id="3" name="Text Placeholder 2"/>
+          <p:cNvSpPr>
+            <a:spLocks noGrp="1"/>
+          </p:cNvSpPr>
+          <p:nvPr>
+            <p:ph type="body" idx="1"/>
+          </p:nvPr>
+        </p:nvSpPr>
+        <p:spPr/>
+        <p:txBody>
+          <a:bodyPr/>
+          <a:lstStyle/>
+          <a:p>
+            <a:r>
+              <a:rPr lang="en-US" sz="1800" b="1" dirty="0">
+                <a:latin typeface="Courier New" panose="02070309020205020404" pitchFamily="49" charset="0"/>
+                <a:cs typeface="Courier New" panose="02070309020205020404" pitchFamily="49" charset="0"/>
+              </a:rPr>
+              <a:t>Data on the recurrence times to infection, at the point of insertion of the catheter, for kidney patients using portable dialysis equipment. Catheters may be removed for reasons other than infection, in which case the observation is censored. Each patient has exactly 2 observations.</a:t>
+            </a:r>
+          </a:p>
+          <a:p>
+            <a:endParaRPr lang="en-US" sz="1800" b="1" dirty="0">
+              <a:latin typeface="Courier New" panose="02070309020205020404" pitchFamily="49" charset="0"/>
+              <a:cs typeface="Courier New" panose="02070309020205020404" pitchFamily="49" charset="0"/>
+            </a:endParaRPr>
+          </a:p>
+          <a:p>
+            <a:r>
+              <a:rPr lang="en-US" sz="1800" b="1" dirty="0">
+                <a:latin typeface="Courier New" panose="02070309020205020404" pitchFamily="49" charset="0"/>
+                <a:cs typeface="Courier New" panose="02070309020205020404" pitchFamily="49" charset="0"/>
+              </a:rPr>
+              <a:t>CA </a:t>
+            </a:r>
+            <a:r>
+              <a:rPr lang="en-US" sz="1800" b="1" dirty="0" err="1">
+                <a:latin typeface="Courier New" panose="02070309020205020404" pitchFamily="49" charset="0"/>
+                <a:cs typeface="Courier New" panose="02070309020205020404" pitchFamily="49" charset="0"/>
+              </a:rPr>
+              <a:t>McGilchrist</a:t>
+            </a:r>
+            <a:r>
+              <a:rPr lang="en-US" sz="1800" b="1" dirty="0">
+                <a:latin typeface="Courier New" panose="02070309020205020404" pitchFamily="49" charset="0"/>
+                <a:cs typeface="Courier New" panose="02070309020205020404" pitchFamily="49" charset="0"/>
+              </a:rPr>
+              <a:t>, CW </a:t>
+            </a:r>
+            <a:r>
+              <a:rPr lang="en-US" sz="1800" b="1" dirty="0" err="1">
+                <a:latin typeface="Courier New" panose="02070309020205020404" pitchFamily="49" charset="0"/>
+                <a:cs typeface="Courier New" panose="02070309020205020404" pitchFamily="49" charset="0"/>
+              </a:rPr>
+              <a:t>Aisbett</a:t>
+            </a:r>
+            <a:r>
+              <a:rPr lang="en-US" sz="1800" b="1" dirty="0">
+                <a:latin typeface="Courier New" panose="02070309020205020404" pitchFamily="49" charset="0"/>
+                <a:cs typeface="Courier New" panose="02070309020205020404" pitchFamily="49" charset="0"/>
+              </a:rPr>
+              <a:t> (1991), Regression with frailty in survival analysis. Biometrics 47, 461–66.</a:t>
+            </a:r>
+          </a:p>
+        </p:txBody>
+      </p:sp>
+      <p:sp>
+        <p:nvSpPr>
+          <p:cNvPr id="4" name="Footer Placeholder 3"/>
+          <p:cNvSpPr>
+            <a:spLocks noGrp="1"/>
+          </p:cNvSpPr>
+          <p:nvPr>
+            <p:ph type="ftr" sz="quarter" idx="10"/>
+          </p:nvPr>
+        </p:nvSpPr>
+        <p:spPr/>
+        <p:txBody>
+          <a:bodyPr/>
+          <a:lstStyle/>
+          <a:p>
+            <a:pPr>
+              <a:defRPr/>
+            </a:pPr>
+            <a:r>
+              <a:rPr lang="en-US" altLang="en-US" dirty="0"/>
+              <a:t>©2018 Steve Simon    http://TheAnalysisFactor.com</a:t>
+            </a:r>
+          </a:p>
+        </p:txBody>
+      </p:sp>
+      <p:sp>
+        <p:nvSpPr>
+          <p:cNvPr id="5" name="Slide Number Placeholder 4"/>
+          <p:cNvSpPr>
+            <a:spLocks noGrp="1"/>
+          </p:cNvSpPr>
+          <p:nvPr>
+            <p:ph type="sldNum" sz="quarter" idx="11"/>
+          </p:nvPr>
+        </p:nvSpPr>
+        <p:spPr/>
+        <p:txBody>
+          <a:bodyPr/>
+          <a:lstStyle/>
+          <a:p>
+            <a:pPr>
+              <a:defRPr/>
+            </a:pPr>
+            <a:endParaRPr lang="en-US"/>
+          </a:p>
+          <a:p>
+            <a:pPr>
+              <a:defRPr/>
+            </a:pPr>
+            <a:fld id="{E9A8CBA3-AA2B-46A6-BFA3-DCEBEAAB3F0A}" type="slidenum">
+              <a:rPr lang="en-US" smtClean="0"/>
+              <a:pPr>
+                <a:defRPr/>
+              </a:pPr>
+              <a:t>17</a:t>
+            </a:fld>
+            <a:endParaRPr lang="en-US"/>
+          </a:p>
+        </p:txBody>
+      </p:sp>
+      <p:sp>
+        <p:nvSpPr>
+          <p:cNvPr id="6" name="Text Placeholder 5"/>
+          <p:cNvSpPr>
+            <a:spLocks noGrp="1"/>
+          </p:cNvSpPr>
+          <p:nvPr>
+            <p:ph type="body" sz="quarter" idx="12"/>
+          </p:nvPr>
+        </p:nvSpPr>
+        <p:spPr/>
+        <p:txBody>
+          <a:bodyPr/>
+          <a:lstStyle/>
+          <a:p>
+            <a:r>
+              <a:rPr lang="en-US" b="1" dirty="0">
+                <a:latin typeface="Courier New" panose="02070309020205020404" pitchFamily="49" charset="0"/>
+                <a:cs typeface="Courier New" panose="02070309020205020404" pitchFamily="49" charset="0"/>
+              </a:rPr>
+              <a:t>Description</a:t>
+            </a:r>
+            <a:endParaRPr lang="en-US" dirty="0"/>
+          </a:p>
+        </p:txBody>
+      </p:sp>
+    </p:spTree>
+    <p:extLst>
+      <p:ext uri="{BB962C8B-B14F-4D97-AF65-F5344CB8AC3E}">
+        <p14:creationId xmlns:p14="http://schemas.microsoft.com/office/powerpoint/2010/main" val="3305200947"/>
+      </p:ext>
+    </p:extLst>
+  </p:cSld>
+  <p:clrMapOvr>
+    <a:masterClrMapping/>
+  </p:clrMapOvr>
+</p:sld>
+</file>
+
+<file path=ppt/slides/slide18.xml><?xml version="1.0" encoding="utf-8"?>
+<p:sld xmlns:a="http://schemas.openxmlformats.org/drawingml/2006/main" xmlns:r="http://schemas.openxmlformats.org/officeDocument/2006/relationships" xmlns:p="http://schemas.openxmlformats.org/presentationml/2006/main">
+  <p:cSld>
+    <p:spTree>
+      <p:nvGrpSpPr>
+        <p:cNvPr id="1" name=""/>
+        <p:cNvGrpSpPr/>
+        <p:nvPr/>
+      </p:nvGrpSpPr>
+      <p:grpSpPr>
+        <a:xfrm>
+          <a:off x="0" y="0"/>
+          <a:ext cx="0" cy="0"/>
+          <a:chOff x="0" y="0"/>
+          <a:chExt cx="0" cy="0"/>
+        </a:xfrm>
+      </p:grpSpPr>
+      <p:sp>
+        <p:nvSpPr>
+          <p:cNvPr id="2" name="Title 1"/>
+          <p:cNvSpPr>
+            <a:spLocks noGrp="1"/>
+          </p:cNvSpPr>
+          <p:nvPr>
+            <p:ph type="title"/>
+          </p:nvPr>
+        </p:nvSpPr>
+        <p:spPr/>
+        <p:txBody>
+          <a:bodyPr/>
+          <a:lstStyle/>
+          <a:p>
+            <a:r>
+              <a:rPr lang="en-US" dirty="0"/>
+              <a:t>Kidney data set</a:t>
+            </a:r>
+          </a:p>
+        </p:txBody>
+      </p:sp>
+      <p:sp>
+        <p:nvSpPr>
+          <p:cNvPr id="3" name="Text Placeholder 2"/>
+          <p:cNvSpPr>
+            <a:spLocks noGrp="1"/>
+          </p:cNvSpPr>
+          <p:nvPr>
+            <p:ph type="body" idx="1"/>
+          </p:nvPr>
+        </p:nvSpPr>
+        <p:spPr/>
+        <p:txBody>
+          <a:bodyPr/>
+          <a:lstStyle/>
+          <a:p>
+            <a:pPr marL="285750" indent="-285750">
+              <a:buFont typeface="Arial" panose="020B0604020202020204" pitchFamily="34" charset="0"/>
+              <a:buChar char="•"/>
+            </a:pPr>
+            <a:r>
+              <a:rPr lang="en-US" sz="1800" b="1" dirty="0">
+                <a:latin typeface="Courier New" panose="02070309020205020404" pitchFamily="49" charset="0"/>
+                <a:cs typeface="Courier New" panose="02070309020205020404" pitchFamily="49" charset="0"/>
+              </a:rPr>
+              <a:t>patient: id</a:t>
+            </a:r>
+          </a:p>
+          <a:p>
+            <a:pPr marL="285750" indent="-285750">
+              <a:buFont typeface="Arial" panose="020B0604020202020204" pitchFamily="34" charset="0"/>
+              <a:buChar char="•"/>
+            </a:pPr>
+            <a:r>
+              <a:rPr lang="en-US" sz="1800" b="1" dirty="0">
+                <a:latin typeface="Courier New" panose="02070309020205020404" pitchFamily="49" charset="0"/>
+                <a:cs typeface="Courier New" panose="02070309020205020404" pitchFamily="49" charset="0"/>
+              </a:rPr>
+              <a:t>time: time</a:t>
+            </a:r>
+          </a:p>
+          <a:p>
+            <a:pPr marL="285750" indent="-285750">
+              <a:buFont typeface="Arial" panose="020B0604020202020204" pitchFamily="34" charset="0"/>
+              <a:buChar char="•"/>
+            </a:pPr>
+            <a:r>
+              <a:rPr lang="en-US" sz="1800" b="1" dirty="0">
+                <a:latin typeface="Courier New" panose="02070309020205020404" pitchFamily="49" charset="0"/>
+                <a:cs typeface="Courier New" panose="02070309020205020404" pitchFamily="49" charset="0"/>
+              </a:rPr>
+              <a:t>status: event status</a:t>
+            </a:r>
+          </a:p>
+          <a:p>
+            <a:pPr marL="285750" indent="-285750">
+              <a:buFont typeface="Arial" panose="020B0604020202020204" pitchFamily="34" charset="0"/>
+              <a:buChar char="•"/>
+            </a:pPr>
+            <a:r>
+              <a:rPr lang="en-US" sz="1800" b="1" dirty="0">
+                <a:latin typeface="Courier New" panose="02070309020205020404" pitchFamily="49" charset="0"/>
+                <a:cs typeface="Courier New" panose="02070309020205020404" pitchFamily="49" charset="0"/>
+              </a:rPr>
+              <a:t>age: in years</a:t>
+            </a:r>
+          </a:p>
+          <a:p>
+            <a:pPr marL="285750" indent="-285750">
+              <a:buFont typeface="Arial" panose="020B0604020202020204" pitchFamily="34" charset="0"/>
+              <a:buChar char="•"/>
+            </a:pPr>
+            <a:r>
+              <a:rPr lang="en-US" sz="1800" b="1" dirty="0">
+                <a:latin typeface="Courier New" panose="02070309020205020404" pitchFamily="49" charset="0"/>
+                <a:cs typeface="Courier New" panose="02070309020205020404" pitchFamily="49" charset="0"/>
+              </a:rPr>
+              <a:t>sex: 1=male, 2=female</a:t>
+            </a:r>
+          </a:p>
+          <a:p>
+            <a:pPr marL="285750" indent="-285750">
+              <a:buFont typeface="Arial" panose="020B0604020202020204" pitchFamily="34" charset="0"/>
+              <a:buChar char="•"/>
+            </a:pPr>
+            <a:r>
+              <a:rPr lang="en-US" sz="1800" b="1" dirty="0">
+                <a:latin typeface="Courier New" panose="02070309020205020404" pitchFamily="49" charset="0"/>
+                <a:cs typeface="Courier New" panose="02070309020205020404" pitchFamily="49" charset="0"/>
+              </a:rPr>
+              <a:t>disease: disease type (0=GN, 1=AN, 2=PKD, 3=Other)</a:t>
+            </a:r>
+          </a:p>
+          <a:p>
+            <a:pPr marL="285750" indent="-285750">
+              <a:buFont typeface="Arial" panose="020B0604020202020204" pitchFamily="34" charset="0"/>
+              <a:buChar char="•"/>
+            </a:pPr>
+            <a:r>
+              <a:rPr lang="en-US" sz="1800" b="1" dirty="0">
+                <a:latin typeface="Courier New" panose="02070309020205020404" pitchFamily="49" charset="0"/>
+                <a:cs typeface="Courier New" panose="02070309020205020404" pitchFamily="49" charset="0"/>
+              </a:rPr>
+              <a:t>frail: frailty estimate from original paper</a:t>
+            </a:r>
+          </a:p>
+        </p:txBody>
+      </p:sp>
+      <p:sp>
+        <p:nvSpPr>
+          <p:cNvPr id="4" name="Footer Placeholder 3"/>
+          <p:cNvSpPr>
+            <a:spLocks noGrp="1"/>
+          </p:cNvSpPr>
+          <p:nvPr>
+            <p:ph type="ftr" sz="quarter" idx="10"/>
+          </p:nvPr>
+        </p:nvSpPr>
+        <p:spPr/>
+        <p:txBody>
+          <a:bodyPr/>
+          <a:lstStyle/>
+          <a:p>
+            <a:pPr>
+              <a:defRPr/>
+            </a:pPr>
+            <a:r>
+              <a:rPr lang="en-US" altLang="en-US" dirty="0"/>
+              <a:t>©2018 Steve Simon    http://TheAnalysisFactor.com</a:t>
+            </a:r>
+          </a:p>
+        </p:txBody>
+      </p:sp>
+      <p:sp>
+        <p:nvSpPr>
+          <p:cNvPr id="5" name="Slide Number Placeholder 4"/>
+          <p:cNvSpPr>
+            <a:spLocks noGrp="1"/>
+          </p:cNvSpPr>
+          <p:nvPr>
+            <p:ph type="sldNum" sz="quarter" idx="11"/>
+          </p:nvPr>
+        </p:nvSpPr>
+        <p:spPr/>
+        <p:txBody>
+          <a:bodyPr/>
+          <a:lstStyle/>
+          <a:p>
+            <a:pPr>
+              <a:defRPr/>
+            </a:pPr>
+            <a:endParaRPr lang="en-US"/>
+          </a:p>
+          <a:p>
+            <a:pPr>
+              <a:defRPr/>
+            </a:pPr>
+            <a:fld id="{E9A8CBA3-AA2B-46A6-BFA3-DCEBEAAB3F0A}" type="slidenum">
+              <a:rPr lang="en-US" smtClean="0"/>
+              <a:pPr>
+                <a:defRPr/>
+              </a:pPr>
+              <a:t>18</a:t>
+            </a:fld>
+            <a:endParaRPr lang="en-US"/>
+          </a:p>
+        </p:txBody>
+      </p:sp>
+      <p:sp>
+        <p:nvSpPr>
+          <p:cNvPr id="6" name="Text Placeholder 5"/>
+          <p:cNvSpPr>
+            <a:spLocks noGrp="1"/>
+          </p:cNvSpPr>
+          <p:nvPr>
+            <p:ph type="body" sz="quarter" idx="12"/>
+          </p:nvPr>
+        </p:nvSpPr>
+        <p:spPr/>
+        <p:txBody>
+          <a:bodyPr/>
+          <a:lstStyle/>
+          <a:p>
+            <a:r>
+              <a:rPr lang="en-US" b="1" dirty="0">
+                <a:latin typeface="Courier New" panose="02070309020205020404" pitchFamily="49" charset="0"/>
+                <a:cs typeface="Courier New" panose="02070309020205020404" pitchFamily="49" charset="0"/>
+              </a:rPr>
+              <a:t>76 observations and 7 variables.</a:t>
+            </a:r>
+            <a:endParaRPr lang="en-US" dirty="0"/>
+          </a:p>
+        </p:txBody>
+      </p:sp>
+    </p:spTree>
+    <p:extLst>
+      <p:ext uri="{BB962C8B-B14F-4D97-AF65-F5344CB8AC3E}">
+        <p14:creationId xmlns:p14="http://schemas.microsoft.com/office/powerpoint/2010/main" val="3330262570"/>
+      </p:ext>
+    </p:extLst>
+  </p:cSld>
+  <p:clrMapOvr>
+    <a:masterClrMapping/>
+  </p:clrMapOvr>
+</p:sld>
+</file>
+
+<file path=ppt/slides/slide19.xml><?xml version="1.0" encoding="utf-8"?>
+<p:sld xmlns:a="http://schemas.openxmlformats.org/drawingml/2006/main" xmlns:r="http://schemas.openxmlformats.org/officeDocument/2006/relationships" xmlns:p="http://schemas.openxmlformats.org/presentationml/2006/main">
+  <p:cSld>
+    <p:spTree>
+      <p:nvGrpSpPr>
+        <p:cNvPr id="1" name=""/>
+        <p:cNvGrpSpPr/>
+        <p:nvPr/>
+      </p:nvGrpSpPr>
+      <p:grpSpPr>
+        <a:xfrm>
+          <a:off x="0" y="0"/>
+          <a:ext cx="0" cy="0"/>
+          <a:chOff x="0" y="0"/>
+          <a:chExt cx="0" cy="0"/>
+        </a:xfrm>
+      </p:grpSpPr>
+      <p:sp>
+        <p:nvSpPr>
+          <p:cNvPr id="2" name="Title 1"/>
+          <p:cNvSpPr>
+            <a:spLocks noGrp="1"/>
+          </p:cNvSpPr>
+          <p:nvPr>
+            <p:ph type="title"/>
+          </p:nvPr>
+        </p:nvSpPr>
+        <p:spPr/>
+        <p:txBody>
+          <a:bodyPr/>
+          <a:lstStyle/>
+          <a:p>
+            <a:r>
+              <a:rPr lang="en-US" dirty="0"/>
+              <a:t>Kidney data set</a:t>
+            </a:r>
+          </a:p>
+        </p:txBody>
+      </p:sp>
+      <p:sp>
+        <p:nvSpPr>
+          <p:cNvPr id="3" name="Text Placeholder 2"/>
+          <p:cNvSpPr>
+            <a:spLocks noGrp="1"/>
+          </p:cNvSpPr>
+          <p:nvPr>
+            <p:ph type="body" idx="1"/>
+          </p:nvPr>
+        </p:nvSpPr>
+        <p:spPr/>
+        <p:txBody>
+          <a:bodyPr/>
+          <a:lstStyle/>
+          <a:p>
+            <a:r>
+              <a:rPr lang="en-US" sz="1800" b="1" dirty="0">
+                <a:latin typeface="Courier New" panose="02070309020205020404" pitchFamily="49" charset="0"/>
+                <a:cs typeface="Courier New" panose="02070309020205020404" pitchFamily="49" charset="0"/>
+              </a:rPr>
+              <a:t>  id time status age sex disease frail</a:t>
+            </a:r>
+          </a:p>
+          <a:p>
+            <a:r>
+              <a:rPr lang="en-US" sz="1800" b="1" dirty="0">
+                <a:latin typeface="Courier New" panose="02070309020205020404" pitchFamily="49" charset="0"/>
+                <a:cs typeface="Courier New" panose="02070309020205020404" pitchFamily="49" charset="0"/>
+              </a:rPr>
+              <a:t>1  1    8      1  28   1   Other   2.3</a:t>
+            </a:r>
+          </a:p>
+          <a:p>
+            <a:r>
+              <a:rPr lang="en-US" sz="1800" b="1" dirty="0">
+                <a:latin typeface="Courier New" panose="02070309020205020404" pitchFamily="49" charset="0"/>
+                <a:cs typeface="Courier New" panose="02070309020205020404" pitchFamily="49" charset="0"/>
+              </a:rPr>
+              <a:t>2  1   16      1  28   1   Other   2.3</a:t>
+            </a:r>
+          </a:p>
+          <a:p>
+            <a:r>
+              <a:rPr lang="en-US" sz="1800" b="1" dirty="0">
+                <a:latin typeface="Courier New" panose="02070309020205020404" pitchFamily="49" charset="0"/>
+                <a:cs typeface="Courier New" panose="02070309020205020404" pitchFamily="49" charset="0"/>
+              </a:rPr>
+              <a:t>3  2   23      1  48   2      GN   1.9</a:t>
+            </a:r>
+          </a:p>
+          <a:p>
+            <a:r>
+              <a:rPr lang="en-US" sz="1800" b="1" dirty="0">
+                <a:latin typeface="Courier New" panose="02070309020205020404" pitchFamily="49" charset="0"/>
+                <a:cs typeface="Courier New" panose="02070309020205020404" pitchFamily="49" charset="0"/>
+              </a:rPr>
+              <a:t>4  2   13      0  48   2      GN   1.9</a:t>
+            </a:r>
+          </a:p>
+          <a:p>
+            <a:r>
+              <a:rPr lang="en-US" sz="1800" b="1" dirty="0">
+                <a:latin typeface="Courier New" panose="02070309020205020404" pitchFamily="49" charset="0"/>
+                <a:cs typeface="Courier New" panose="02070309020205020404" pitchFamily="49" charset="0"/>
+              </a:rPr>
+              <a:t>5  3   22      1  32   1   Other   1.2</a:t>
+            </a:r>
+          </a:p>
+          <a:p>
+            <a:r>
+              <a:rPr lang="en-US" sz="1800" b="1" dirty="0">
+                <a:latin typeface="Courier New" panose="02070309020205020404" pitchFamily="49" charset="0"/>
+                <a:cs typeface="Courier New" panose="02070309020205020404" pitchFamily="49" charset="0"/>
+              </a:rPr>
+              <a:t>6  3   28      1  32   1   Other   1.2</a:t>
+            </a:r>
+          </a:p>
+        </p:txBody>
+      </p:sp>
+      <p:sp>
+        <p:nvSpPr>
+          <p:cNvPr id="4" name="Footer Placeholder 3"/>
+          <p:cNvSpPr>
+            <a:spLocks noGrp="1"/>
+          </p:cNvSpPr>
+          <p:nvPr>
+            <p:ph type="ftr" sz="quarter" idx="10"/>
+          </p:nvPr>
+        </p:nvSpPr>
+        <p:spPr/>
+        <p:txBody>
+          <a:bodyPr/>
+          <a:lstStyle/>
+          <a:p>
+            <a:pPr>
+              <a:defRPr/>
+            </a:pPr>
+            <a:r>
+              <a:rPr lang="en-US" altLang="en-US" dirty="0"/>
+              <a:t>©2018 Steve Simon    http://TheAnalysisFactor.com</a:t>
+            </a:r>
+          </a:p>
+        </p:txBody>
+      </p:sp>
+      <p:sp>
+        <p:nvSpPr>
+          <p:cNvPr id="5" name="Slide Number Placeholder 4"/>
+          <p:cNvSpPr>
+            <a:spLocks noGrp="1"/>
+          </p:cNvSpPr>
+          <p:nvPr>
+            <p:ph type="sldNum" sz="quarter" idx="11"/>
+          </p:nvPr>
+        </p:nvSpPr>
+        <p:spPr/>
+        <p:txBody>
+          <a:bodyPr/>
+          <a:lstStyle/>
+          <a:p>
+            <a:pPr>
+              <a:defRPr/>
+            </a:pPr>
+            <a:endParaRPr lang="en-US"/>
+          </a:p>
+          <a:p>
+            <a:pPr>
+              <a:defRPr/>
+            </a:pPr>
+            <a:fld id="{E9A8CBA3-AA2B-46A6-BFA3-DCEBEAAB3F0A}" type="slidenum">
+              <a:rPr lang="en-US" smtClean="0"/>
+              <a:pPr>
+                <a:defRPr/>
+              </a:pPr>
+              <a:t>19</a:t>
+            </a:fld>
+            <a:endParaRPr lang="en-US"/>
+          </a:p>
+        </p:txBody>
+      </p:sp>
+      <p:sp>
+        <p:nvSpPr>
+          <p:cNvPr id="6" name="Text Placeholder 5"/>
+          <p:cNvSpPr>
+            <a:spLocks noGrp="1"/>
+          </p:cNvSpPr>
+          <p:nvPr>
+            <p:ph type="body" sz="quarter" idx="12"/>
+          </p:nvPr>
+        </p:nvSpPr>
+        <p:spPr/>
+        <p:txBody>
+          <a:bodyPr/>
+          <a:lstStyle/>
+          <a:p>
+            <a:r>
+              <a:rPr lang="en-US" b="1" dirty="0">
+                <a:latin typeface="Courier New" panose="02070309020205020404" pitchFamily="49" charset="0"/>
+                <a:cs typeface="Courier New" panose="02070309020205020404" pitchFamily="49" charset="0"/>
+              </a:rPr>
+              <a:t>First six rows.</a:t>
+            </a:r>
+            <a:endParaRPr lang="en-US" dirty="0"/>
+          </a:p>
+        </p:txBody>
+      </p:sp>
+    </p:spTree>
+    <p:extLst>
+      <p:ext uri="{BB962C8B-B14F-4D97-AF65-F5344CB8AC3E}">
+        <p14:creationId xmlns:p14="http://schemas.microsoft.com/office/powerpoint/2010/main" val="1604538166"/>
+      </p:ext>
+    </p:extLst>
+  </p:cSld>
+  <p:clrMapOvr>
+    <a:masterClrMapping/>
+  </p:clrMapOvr>
+</p:sld>
+</file>
+
+<file path=ppt/slides/slide2.xml><?xml version="1.0" encoding="utf-8"?>
+<p:sld xmlns:a="http://schemas.openxmlformats.org/drawingml/2006/main" xmlns:r="http://schemas.openxmlformats.org/officeDocument/2006/relationships" xmlns:p="http://schemas.openxmlformats.org/presentationml/2006/main">
+  <p:cSld>
+    <p:spTree>
+      <p:nvGrpSpPr>
+        <p:cNvPr id="1" name=""/>
+        <p:cNvGrpSpPr/>
+        <p:nvPr/>
+      </p:nvGrpSpPr>
+      <p:grpSpPr>
+        <a:xfrm>
+          <a:off x="0" y="0"/>
+          <a:ext cx="0" cy="0"/>
+          <a:chOff x="0" y="0"/>
+          <a:chExt cx="0" cy="0"/>
+        </a:xfrm>
+      </p:grpSpPr>
+      <p:sp>
+        <p:nvSpPr>
+          <p:cNvPr id="2" name="Title 1"/>
+          <p:cNvSpPr>
+            <a:spLocks noGrp="1"/>
+          </p:cNvSpPr>
+          <p:nvPr>
+            <p:ph type="title"/>
+          </p:nvPr>
+        </p:nvSpPr>
+        <p:spPr/>
+        <p:txBody>
+          <a:bodyPr/>
+          <a:lstStyle/>
+          <a:p>
+            <a:r>
+              <a:rPr lang="en-US" dirty="0"/>
+              <a:t>Abstract</a:t>
+            </a:r>
+          </a:p>
+        </p:txBody>
+      </p:sp>
+      <p:sp>
+        <p:nvSpPr>
+          <p:cNvPr id="3" name="Text Placeholder 2"/>
+          <p:cNvSpPr>
+            <a:spLocks noGrp="1"/>
+          </p:cNvSpPr>
+          <p:nvPr>
+            <p:ph type="body" idx="1"/>
+          </p:nvPr>
+        </p:nvSpPr>
+        <p:spPr/>
+        <p:txBody>
+          <a:bodyPr/>
+          <a:lstStyle/>
+          <a:p>
+            <a:r>
+              <a:rPr lang="en-US" dirty="0"/>
+              <a:t>Lecture 7. Frailty models. You can incorporate multiple events per patient and account for center effects using frailty models, the survival data analysis equivalent to mixed models in linear regression. You’ll see how to define random effects and how to fit and interpret these models.</a:t>
+            </a:r>
+          </a:p>
+        </p:txBody>
+      </p:sp>
+      <p:sp>
+        <p:nvSpPr>
+          <p:cNvPr id="4" name="Footer Placeholder 3"/>
+          <p:cNvSpPr>
+            <a:spLocks noGrp="1"/>
+          </p:cNvSpPr>
+          <p:nvPr>
+            <p:ph type="ftr" sz="quarter" idx="10"/>
+          </p:nvPr>
+        </p:nvSpPr>
+        <p:spPr/>
+        <p:txBody>
+          <a:bodyPr/>
+          <a:lstStyle/>
+          <a:p>
+            <a:pPr>
+              <a:defRPr/>
+            </a:pPr>
+            <a:r>
+              <a:rPr lang="en-US" altLang="en-US" dirty="0"/>
+              <a:t>©2018 Steve Simon    http://TheAnalysisFactor.com</a:t>
+            </a:r>
+          </a:p>
+        </p:txBody>
+      </p:sp>
+      <p:sp>
+        <p:nvSpPr>
+          <p:cNvPr id="5" name="Slide Number Placeholder 4"/>
+          <p:cNvSpPr>
+            <a:spLocks noGrp="1"/>
+          </p:cNvSpPr>
+          <p:nvPr>
+            <p:ph type="sldNum" sz="quarter" idx="11"/>
+          </p:nvPr>
+        </p:nvSpPr>
+        <p:spPr/>
+        <p:txBody>
+          <a:bodyPr/>
+          <a:lstStyle/>
+          <a:p>
+            <a:pPr>
+              <a:defRPr/>
+            </a:pPr>
+            <a:endParaRPr lang="en-US"/>
+          </a:p>
+          <a:p>
+            <a:pPr>
+              <a:defRPr/>
+            </a:pPr>
+            <a:fld id="{E9A8CBA3-AA2B-46A6-BFA3-DCEBEAAB3F0A}" type="slidenum">
+              <a:rPr lang="en-US" smtClean="0"/>
+              <a:pPr>
+                <a:defRPr/>
+              </a:pPr>
+              <a:t>2</a:t>
+            </a:fld>
+            <a:endParaRPr lang="en-US"/>
+          </a:p>
+        </p:txBody>
+      </p:sp>
+      <p:sp>
+        <p:nvSpPr>
+          <p:cNvPr id="6" name="Text Placeholder 5"/>
+          <p:cNvSpPr>
+            <a:spLocks noGrp="1"/>
+          </p:cNvSpPr>
+          <p:nvPr>
+            <p:ph type="body" sz="quarter" idx="12"/>
+          </p:nvPr>
+        </p:nvSpPr>
+        <p:spPr/>
+        <p:txBody>
+          <a:bodyPr/>
+          <a:lstStyle/>
+          <a:p>
+            <a:r>
+              <a:rPr lang="en-US" dirty="0"/>
+              <a:t>Lecture 7.</a:t>
+            </a:r>
+          </a:p>
+        </p:txBody>
+      </p:sp>
+    </p:spTree>
+    <p:extLst>
+      <p:ext uri="{BB962C8B-B14F-4D97-AF65-F5344CB8AC3E}">
+        <p14:creationId xmlns:p14="http://schemas.microsoft.com/office/powerpoint/2010/main" val="3091858404"/>
+      </p:ext>
+    </p:extLst>
+  </p:cSld>
+  <p:clrMapOvr>
+    <a:masterClrMapping/>
+  </p:clrMapOvr>
+</p:sld>
+</file>
+
+<file path=ppt/slides/slide20.xml><?xml version="1.0" encoding="utf-8"?>
+<p:sld xmlns:a="http://schemas.openxmlformats.org/drawingml/2006/main" xmlns:r="http://schemas.openxmlformats.org/officeDocument/2006/relationships" xmlns:p="http://schemas.openxmlformats.org/presentationml/2006/main">
+  <p:cSld>
+    <p:spTree>
+      <p:nvGrpSpPr>
+        <p:cNvPr id="1" name=""/>
+        <p:cNvGrpSpPr/>
+        <p:nvPr/>
+      </p:nvGrpSpPr>
+      <p:grpSpPr>
+        <a:xfrm>
+          <a:off x="0" y="0"/>
+          <a:ext cx="0" cy="0"/>
+          <a:chOff x="0" y="0"/>
+          <a:chExt cx="0" cy="0"/>
+        </a:xfrm>
+      </p:grpSpPr>
+      <p:sp>
+        <p:nvSpPr>
+          <p:cNvPr id="2" name="Title 1"/>
+          <p:cNvSpPr>
+            <a:spLocks noGrp="1"/>
+          </p:cNvSpPr>
+          <p:nvPr>
+            <p:ph type="title"/>
+          </p:nvPr>
+        </p:nvSpPr>
+        <p:spPr/>
+        <p:txBody>
+          <a:bodyPr/>
+          <a:lstStyle/>
+          <a:p>
+            <a:r>
+              <a:rPr lang="en-US" dirty="0"/>
+              <a:t>Kidney data set</a:t>
+            </a:r>
+          </a:p>
+        </p:txBody>
+      </p:sp>
+      <p:sp>
+        <p:nvSpPr>
+          <p:cNvPr id="3" name="Text Placeholder 2"/>
+          <p:cNvSpPr>
+            <a:spLocks noGrp="1"/>
+          </p:cNvSpPr>
+          <p:nvPr>
+            <p:ph type="body" idx="1"/>
+          </p:nvPr>
+        </p:nvSpPr>
+        <p:spPr/>
+        <p:txBody>
+          <a:bodyPr/>
+          <a:lstStyle/>
+          <a:p>
+            <a:r>
+              <a:rPr lang="en-US" sz="1800" b="1" dirty="0">
+                <a:latin typeface="Courier New" panose="02070309020205020404" pitchFamily="49" charset="0"/>
+                <a:cs typeface="Courier New" panose="02070309020205020404" pitchFamily="49" charset="0"/>
+              </a:rPr>
+              <a:t>status  0  1 </a:t>
+            </a:r>
+          </a:p>
+          <a:p>
+            <a:r>
+              <a:rPr lang="en-US" sz="1800" b="1" dirty="0">
+                <a:latin typeface="Courier New" panose="02070309020205020404" pitchFamily="49" charset="0"/>
+                <a:cs typeface="Courier New" panose="02070309020205020404" pitchFamily="49" charset="0"/>
+              </a:rPr>
+              <a:t>       18 58</a:t>
+            </a:r>
+          </a:p>
+          <a:p>
+            <a:endParaRPr lang="en-US" sz="1800" b="1" dirty="0">
+              <a:latin typeface="Courier New" panose="02070309020205020404" pitchFamily="49" charset="0"/>
+              <a:cs typeface="Courier New" panose="02070309020205020404" pitchFamily="49" charset="0"/>
+            </a:endParaRPr>
+          </a:p>
+          <a:p>
+            <a:r>
+              <a:rPr lang="en-US" sz="1800" b="1" dirty="0">
+                <a:latin typeface="Courier New" panose="02070309020205020404" pitchFamily="49" charset="0"/>
+                <a:cs typeface="Courier New" panose="02070309020205020404" pitchFamily="49" charset="0"/>
+              </a:rPr>
+              <a:t>sex     1  2 </a:t>
+            </a:r>
+          </a:p>
+          <a:p>
+            <a:r>
+              <a:rPr lang="en-US" sz="1800" b="1" dirty="0">
+                <a:latin typeface="Courier New" panose="02070309020205020404" pitchFamily="49" charset="0"/>
+                <a:cs typeface="Courier New" panose="02070309020205020404" pitchFamily="49" charset="0"/>
+              </a:rPr>
+              <a:t>       20 56</a:t>
+            </a:r>
+          </a:p>
+          <a:p>
+            <a:endParaRPr lang="en-US" sz="1800" b="1" dirty="0">
+              <a:latin typeface="Courier New" panose="02070309020205020404" pitchFamily="49" charset="0"/>
+              <a:cs typeface="Courier New" panose="02070309020205020404" pitchFamily="49" charset="0"/>
+            </a:endParaRPr>
+          </a:p>
+          <a:p>
+            <a:r>
+              <a:rPr lang="en-US" sz="1800" b="1" dirty="0">
+                <a:latin typeface="Courier New" panose="02070309020205020404" pitchFamily="49" charset="0"/>
+                <a:cs typeface="Courier New" panose="02070309020205020404" pitchFamily="49" charset="0"/>
+              </a:rPr>
+              <a:t>disease Other    GN    AN   PKD </a:t>
+            </a:r>
+          </a:p>
+          <a:p>
+            <a:r>
+              <a:rPr lang="en-US" sz="1800" b="1" dirty="0">
+                <a:latin typeface="Courier New" panose="02070309020205020404" pitchFamily="49" charset="0"/>
+                <a:cs typeface="Courier New" panose="02070309020205020404" pitchFamily="49" charset="0"/>
+              </a:rPr>
+              <a:t>           26    18    24     8</a:t>
+            </a:r>
+          </a:p>
+        </p:txBody>
+      </p:sp>
+      <p:sp>
+        <p:nvSpPr>
+          <p:cNvPr id="4" name="Footer Placeholder 3"/>
+          <p:cNvSpPr>
+            <a:spLocks noGrp="1"/>
+          </p:cNvSpPr>
+          <p:nvPr>
+            <p:ph type="ftr" sz="quarter" idx="10"/>
+          </p:nvPr>
+        </p:nvSpPr>
+        <p:spPr/>
+        <p:txBody>
+          <a:bodyPr/>
+          <a:lstStyle/>
+          <a:p>
+            <a:pPr>
+              <a:defRPr/>
+            </a:pPr>
+            <a:r>
+              <a:rPr lang="en-US" altLang="en-US" dirty="0"/>
+              <a:t>©2018 Steve Simon    http://TheAnalysisFactor.com</a:t>
+            </a:r>
+          </a:p>
+        </p:txBody>
+      </p:sp>
+      <p:sp>
+        <p:nvSpPr>
+          <p:cNvPr id="5" name="Slide Number Placeholder 4"/>
+          <p:cNvSpPr>
+            <a:spLocks noGrp="1"/>
+          </p:cNvSpPr>
+          <p:nvPr>
+            <p:ph type="sldNum" sz="quarter" idx="11"/>
+          </p:nvPr>
+        </p:nvSpPr>
+        <p:spPr/>
+        <p:txBody>
+          <a:bodyPr/>
+          <a:lstStyle/>
+          <a:p>
+            <a:pPr>
+              <a:defRPr/>
+            </a:pPr>
+            <a:endParaRPr lang="en-US"/>
+          </a:p>
+          <a:p>
+            <a:pPr>
+              <a:defRPr/>
+            </a:pPr>
+            <a:fld id="{E9A8CBA3-AA2B-46A6-BFA3-DCEBEAAB3F0A}" type="slidenum">
+              <a:rPr lang="en-US" smtClean="0"/>
+              <a:pPr>
+                <a:defRPr/>
+              </a:pPr>
+              <a:t>20</a:t>
+            </a:fld>
+            <a:endParaRPr lang="en-US"/>
+          </a:p>
+        </p:txBody>
+      </p:sp>
+      <p:sp>
+        <p:nvSpPr>
+          <p:cNvPr id="6" name="Text Placeholder 5"/>
+          <p:cNvSpPr>
+            <a:spLocks noGrp="1"/>
+          </p:cNvSpPr>
+          <p:nvPr>
+            <p:ph type="body" sz="quarter" idx="12"/>
+          </p:nvPr>
+        </p:nvSpPr>
+        <p:spPr/>
+        <p:txBody>
+          <a:bodyPr/>
+          <a:lstStyle/>
+          <a:p>
+            <a:r>
+              <a:rPr lang="en-US" b="1" dirty="0">
+                <a:latin typeface="Courier New" panose="02070309020205020404" pitchFamily="49" charset="0"/>
+                <a:cs typeface="Courier New" panose="02070309020205020404" pitchFamily="49" charset="0"/>
+              </a:rPr>
+              <a:t>Descriptive statistics.</a:t>
+            </a:r>
+            <a:endParaRPr lang="en-US" dirty="0"/>
+          </a:p>
+        </p:txBody>
+      </p:sp>
+    </p:spTree>
+    <p:extLst>
+      <p:ext uri="{BB962C8B-B14F-4D97-AF65-F5344CB8AC3E}">
+        <p14:creationId xmlns:p14="http://schemas.microsoft.com/office/powerpoint/2010/main" val="3160245932"/>
+      </p:ext>
+    </p:extLst>
+  </p:cSld>
+  <p:clrMapOvr>
+    <a:masterClrMapping/>
+  </p:clrMapOvr>
+</p:sld>
+</file>
+
+<file path=ppt/slides/slide21.xml><?xml version="1.0" encoding="utf-8"?>
+<p:sld xmlns:a="http://schemas.openxmlformats.org/drawingml/2006/main" xmlns:r="http://schemas.openxmlformats.org/officeDocument/2006/relationships" xmlns:p="http://schemas.openxmlformats.org/presentationml/2006/main">
+  <p:cSld>
+    <p:spTree>
+      <p:nvGrpSpPr>
+        <p:cNvPr id="1" name=""/>
+        <p:cNvGrpSpPr/>
+        <p:nvPr/>
+      </p:nvGrpSpPr>
+      <p:grpSpPr>
+        <a:xfrm>
+          <a:off x="0" y="0"/>
+          <a:ext cx="0" cy="0"/>
+          <a:chOff x="0" y="0"/>
+          <a:chExt cx="0" cy="0"/>
+        </a:xfrm>
+      </p:grpSpPr>
+      <p:sp>
+        <p:nvSpPr>
+          <p:cNvPr id="2" name="Title 1"/>
+          <p:cNvSpPr>
+            <a:spLocks noGrp="1"/>
+          </p:cNvSpPr>
+          <p:nvPr>
+            <p:ph type="title"/>
+          </p:nvPr>
+        </p:nvSpPr>
+        <p:spPr/>
+        <p:txBody>
+          <a:bodyPr/>
+          <a:lstStyle/>
+          <a:p>
+            <a:r>
+              <a:rPr lang="en-US" dirty="0"/>
+              <a:t>Kidney data set</a:t>
+            </a:r>
+          </a:p>
+        </p:txBody>
+      </p:sp>
+      <p:sp>
+        <p:nvSpPr>
+          <p:cNvPr id="3" name="Text Placeholder 2"/>
+          <p:cNvSpPr>
+            <a:spLocks noGrp="1"/>
+          </p:cNvSpPr>
+          <p:nvPr>
+            <p:ph type="body" idx="1"/>
+          </p:nvPr>
+        </p:nvSpPr>
+        <p:spPr/>
+        <p:txBody>
+          <a:bodyPr/>
+          <a:lstStyle/>
+          <a:p>
+            <a:r>
+              <a:rPr lang="en-US" sz="1800" b="1" dirty="0">
+                <a:latin typeface="Courier New" panose="02070309020205020404" pitchFamily="49" charset="0"/>
+                <a:cs typeface="Courier New" panose="02070309020205020404" pitchFamily="49" charset="0"/>
+              </a:rPr>
+              <a:t>time   Min. 1st Qu.  Median    Mean 3rd Qu.    Max. </a:t>
+            </a:r>
+          </a:p>
+          <a:p>
+            <a:r>
+              <a:rPr lang="en-US" sz="1800" b="1" dirty="0">
+                <a:latin typeface="Courier New" panose="02070309020205020404" pitchFamily="49" charset="0"/>
+                <a:cs typeface="Courier New" panose="02070309020205020404" pitchFamily="49" charset="0"/>
+              </a:rPr>
+              <a:t>        2.0    16.0    39.5   101.6   149.8   562.0</a:t>
+            </a:r>
+          </a:p>
+          <a:p>
+            <a:endParaRPr lang="en-US" sz="1800" b="1" dirty="0">
+              <a:latin typeface="Courier New" panose="02070309020205020404" pitchFamily="49" charset="0"/>
+              <a:cs typeface="Courier New" panose="02070309020205020404" pitchFamily="49" charset="0"/>
+            </a:endParaRPr>
+          </a:p>
+          <a:p>
+            <a:r>
+              <a:rPr lang="en-US" sz="1800" b="1" dirty="0">
+                <a:latin typeface="Courier New" panose="02070309020205020404" pitchFamily="49" charset="0"/>
+                <a:cs typeface="Courier New" panose="02070309020205020404" pitchFamily="49" charset="0"/>
+              </a:rPr>
+              <a:t>age    Min. 1st Qu.  Median    Mean 3rd Qu.    Max. </a:t>
+            </a:r>
+          </a:p>
+          <a:p>
+            <a:r>
+              <a:rPr lang="en-US" sz="1800" b="1" dirty="0">
+                <a:latin typeface="Courier New" panose="02070309020205020404" pitchFamily="49" charset="0"/>
+                <a:cs typeface="Courier New" panose="02070309020205020404" pitchFamily="49" charset="0"/>
+              </a:rPr>
+              <a:t>       10.0    34.0    45.5    43.7    54.0    69.0</a:t>
+            </a:r>
+          </a:p>
+          <a:p>
+            <a:endParaRPr lang="en-US" sz="1800" b="1" dirty="0">
+              <a:latin typeface="Courier New" panose="02070309020205020404" pitchFamily="49" charset="0"/>
+              <a:cs typeface="Courier New" panose="02070309020205020404" pitchFamily="49" charset="0"/>
+            </a:endParaRPr>
+          </a:p>
+          <a:p>
+            <a:r>
+              <a:rPr lang="en-US" sz="1800" b="1" dirty="0">
+                <a:latin typeface="Courier New" panose="02070309020205020404" pitchFamily="49" charset="0"/>
+                <a:cs typeface="Courier New" panose="02070309020205020404" pitchFamily="49" charset="0"/>
+              </a:rPr>
+              <a:t>frail  Min. 1st Qu.  Median    Mean 3rd Qu.    Max. </a:t>
+            </a:r>
+          </a:p>
+          <a:p>
+            <a:r>
+              <a:rPr lang="en-US" sz="1800" b="1" dirty="0">
+                <a:latin typeface="Courier New" panose="02070309020205020404" pitchFamily="49" charset="0"/>
+                <a:cs typeface="Courier New" panose="02070309020205020404" pitchFamily="49" charset="0"/>
+              </a:rPr>
+              <a:t>      0.200   0.600   1.100   1.184   1.500   3.000</a:t>
+            </a:r>
+          </a:p>
+          <a:p>
+            <a:endParaRPr lang="en-US" sz="1800" b="1" dirty="0">
+              <a:latin typeface="Courier New" panose="02070309020205020404" pitchFamily="49" charset="0"/>
+              <a:cs typeface="Courier New" panose="02070309020205020404" pitchFamily="49" charset="0"/>
+            </a:endParaRPr>
+          </a:p>
+          <a:p>
+            <a:endParaRPr lang="en-US" sz="1800" b="1" dirty="0">
+              <a:latin typeface="Courier New" panose="02070309020205020404" pitchFamily="49" charset="0"/>
+              <a:cs typeface="Courier New" panose="02070309020205020404" pitchFamily="49" charset="0"/>
+            </a:endParaRPr>
+          </a:p>
+          <a:p>
+            <a:endParaRPr lang="en-US" sz="1800" b="1" dirty="0">
+              <a:latin typeface="Courier New" panose="02070309020205020404" pitchFamily="49" charset="0"/>
+              <a:cs typeface="Courier New" panose="02070309020205020404" pitchFamily="49" charset="0"/>
+            </a:endParaRPr>
+          </a:p>
+          <a:p>
+            <a:endParaRPr lang="en-US" sz="1800" b="1" dirty="0">
+              <a:latin typeface="Courier New" panose="02070309020205020404" pitchFamily="49" charset="0"/>
+              <a:cs typeface="Courier New" panose="02070309020205020404" pitchFamily="49" charset="0"/>
+            </a:endParaRPr>
+          </a:p>
+          <a:p>
+            <a:endParaRPr lang="en-US" sz="1800" b="1" dirty="0">
+              <a:latin typeface="Courier New" panose="02070309020205020404" pitchFamily="49" charset="0"/>
+              <a:cs typeface="Courier New" panose="02070309020205020404" pitchFamily="49" charset="0"/>
+            </a:endParaRPr>
+          </a:p>
+          <a:p>
+            <a:endParaRPr lang="en-US" sz="1800" b="1" dirty="0">
+              <a:latin typeface="Courier New" panose="02070309020205020404" pitchFamily="49" charset="0"/>
+              <a:cs typeface="Courier New" panose="02070309020205020404" pitchFamily="49" charset="0"/>
+            </a:endParaRPr>
+          </a:p>
+          <a:p>
+            <a:endParaRPr lang="en-US" sz="1800" b="1" dirty="0">
+              <a:latin typeface="Courier New" panose="02070309020205020404" pitchFamily="49" charset="0"/>
+              <a:cs typeface="Courier New" panose="02070309020205020404" pitchFamily="49" charset="0"/>
+            </a:endParaRPr>
+          </a:p>
+          <a:p>
+            <a:endParaRPr lang="en-US" sz="1800" b="1" dirty="0">
+              <a:latin typeface="Courier New" panose="02070309020205020404" pitchFamily="49" charset="0"/>
+              <a:cs typeface="Courier New" panose="02070309020205020404" pitchFamily="49" charset="0"/>
+            </a:endParaRPr>
+          </a:p>
+          <a:p>
+            <a:endParaRPr lang="en-US" sz="1800" b="1" dirty="0">
+              <a:latin typeface="Courier New" panose="02070309020205020404" pitchFamily="49" charset="0"/>
+              <a:cs typeface="Courier New" panose="02070309020205020404" pitchFamily="49" charset="0"/>
+            </a:endParaRPr>
+          </a:p>
+          <a:p>
+            <a:endParaRPr lang="en-US" sz="1800" b="1" dirty="0">
+              <a:latin typeface="Courier New" panose="02070309020205020404" pitchFamily="49" charset="0"/>
+              <a:cs typeface="Courier New" panose="02070309020205020404" pitchFamily="49" charset="0"/>
+            </a:endParaRPr>
+          </a:p>
+          <a:p>
+            <a:endParaRPr lang="en-US" sz="1800" b="1" dirty="0">
+              <a:latin typeface="Courier New" panose="02070309020205020404" pitchFamily="49" charset="0"/>
+              <a:cs typeface="Courier New" panose="02070309020205020404" pitchFamily="49" charset="0"/>
+            </a:endParaRPr>
+          </a:p>
+          <a:p>
+            <a:endParaRPr lang="en-US" sz="1800" b="1" dirty="0">
+              <a:latin typeface="Courier New" panose="02070309020205020404" pitchFamily="49" charset="0"/>
+              <a:cs typeface="Courier New" panose="02070309020205020404" pitchFamily="49" charset="0"/>
+            </a:endParaRPr>
+          </a:p>
+          <a:p>
+            <a:endParaRPr lang="en-US" sz="1800" b="1" dirty="0">
+              <a:latin typeface="Courier New" panose="02070309020205020404" pitchFamily="49" charset="0"/>
+              <a:cs typeface="Courier New" panose="02070309020205020404" pitchFamily="49" charset="0"/>
+            </a:endParaRPr>
+          </a:p>
+          <a:p>
+            <a:endParaRPr lang="en-US" sz="1800" b="1" dirty="0">
+              <a:latin typeface="Courier New" panose="02070309020205020404" pitchFamily="49" charset="0"/>
+              <a:cs typeface="Courier New" panose="02070309020205020404" pitchFamily="49" charset="0"/>
+            </a:endParaRPr>
+          </a:p>
+          <a:p>
+            <a:endParaRPr lang="en-US" sz="1800" b="1" dirty="0">
+              <a:latin typeface="Courier New" panose="02070309020205020404" pitchFamily="49" charset="0"/>
+              <a:cs typeface="Courier New" panose="02070309020205020404" pitchFamily="49" charset="0"/>
+            </a:endParaRPr>
+          </a:p>
+          <a:p>
+            <a:endParaRPr lang="en-US" sz="1800" b="1" dirty="0">
+              <a:latin typeface="Courier New" panose="02070309020205020404" pitchFamily="49" charset="0"/>
+              <a:cs typeface="Courier New" panose="02070309020205020404" pitchFamily="49" charset="0"/>
+            </a:endParaRPr>
+          </a:p>
+          <a:p>
+            <a:endParaRPr lang="en-US" sz="1800" b="1" dirty="0">
+              <a:latin typeface="Courier New" panose="02070309020205020404" pitchFamily="49" charset="0"/>
+              <a:cs typeface="Courier New" panose="02070309020205020404" pitchFamily="49" charset="0"/>
+            </a:endParaRPr>
+          </a:p>
+          <a:p>
+            <a:endParaRPr lang="en-US" sz="1800" b="1" dirty="0">
+              <a:latin typeface="Courier New" panose="02070309020205020404" pitchFamily="49" charset="0"/>
+              <a:cs typeface="Courier New" panose="02070309020205020404" pitchFamily="49" charset="0"/>
+            </a:endParaRPr>
+          </a:p>
+          <a:p>
+            <a:endParaRPr lang="en-US" sz="1800" b="1" dirty="0">
+              <a:latin typeface="Courier New" panose="02070309020205020404" pitchFamily="49" charset="0"/>
+              <a:cs typeface="Courier New" panose="02070309020205020404" pitchFamily="49" charset="0"/>
+            </a:endParaRPr>
+          </a:p>
+          <a:p>
+            <a:endParaRPr lang="en-US" sz="1800" b="1" dirty="0">
+              <a:latin typeface="Courier New" panose="02070309020205020404" pitchFamily="49" charset="0"/>
+              <a:cs typeface="Courier New" panose="02070309020205020404" pitchFamily="49" charset="0"/>
+            </a:endParaRPr>
+          </a:p>
+          <a:p>
+            <a:endParaRPr lang="en-US" sz="1800" b="1" dirty="0">
+              <a:latin typeface="Courier New" panose="02070309020205020404" pitchFamily="49" charset="0"/>
+              <a:cs typeface="Courier New" panose="02070309020205020404" pitchFamily="49" charset="0"/>
+            </a:endParaRPr>
+          </a:p>
+          <a:p>
+            <a:endParaRPr lang="en-US" sz="1800" b="1" dirty="0">
+              <a:latin typeface="Courier New" panose="02070309020205020404" pitchFamily="49" charset="0"/>
+              <a:cs typeface="Courier New" panose="02070309020205020404" pitchFamily="49" charset="0"/>
+            </a:endParaRPr>
+          </a:p>
+          <a:p>
+            <a:endParaRPr lang="en-US" sz="1800" b="1" dirty="0">
+              <a:latin typeface="Courier New" panose="02070309020205020404" pitchFamily="49" charset="0"/>
+              <a:cs typeface="Courier New" panose="02070309020205020404" pitchFamily="49" charset="0"/>
+            </a:endParaRPr>
+          </a:p>
+          <a:p>
+            <a:endParaRPr lang="en-US" sz="1800" b="1" dirty="0">
+              <a:latin typeface="Courier New" panose="02070309020205020404" pitchFamily="49" charset="0"/>
+              <a:cs typeface="Courier New" panose="02070309020205020404" pitchFamily="49" charset="0"/>
+            </a:endParaRPr>
+          </a:p>
+          <a:p>
+            <a:endParaRPr lang="en-US" sz="1800" b="1" dirty="0">
+              <a:latin typeface="Courier New" panose="02070309020205020404" pitchFamily="49" charset="0"/>
+              <a:cs typeface="Courier New" panose="02070309020205020404" pitchFamily="49" charset="0"/>
+            </a:endParaRPr>
+          </a:p>
+          <a:p>
+            <a:endParaRPr lang="en-US" sz="1800" b="1" dirty="0">
+              <a:latin typeface="Courier New" panose="02070309020205020404" pitchFamily="49" charset="0"/>
+              <a:cs typeface="Courier New" panose="02070309020205020404" pitchFamily="49" charset="0"/>
+            </a:endParaRPr>
+          </a:p>
+          <a:p>
+            <a:endParaRPr lang="en-US" sz="1800" b="1" dirty="0">
+              <a:latin typeface="Courier New" panose="02070309020205020404" pitchFamily="49" charset="0"/>
+              <a:cs typeface="Courier New" panose="02070309020205020404" pitchFamily="49" charset="0"/>
+            </a:endParaRPr>
+          </a:p>
+          <a:p>
+            <a:endParaRPr lang="en-US" sz="1800" b="1" dirty="0">
+              <a:latin typeface="Courier New" panose="02070309020205020404" pitchFamily="49" charset="0"/>
+              <a:cs typeface="Courier New" panose="02070309020205020404" pitchFamily="49" charset="0"/>
+            </a:endParaRPr>
+          </a:p>
+          <a:p>
+            <a:endParaRPr lang="en-US" sz="1800" b="1" dirty="0">
+              <a:latin typeface="Courier New" panose="02070309020205020404" pitchFamily="49" charset="0"/>
+              <a:cs typeface="Courier New" panose="02070309020205020404" pitchFamily="49" charset="0"/>
+            </a:endParaRPr>
+          </a:p>
+          <a:p>
+            <a:endParaRPr lang="en-US" sz="1800" b="1" dirty="0">
+              <a:latin typeface="Courier New" panose="02070309020205020404" pitchFamily="49" charset="0"/>
+              <a:cs typeface="Courier New" panose="02070309020205020404" pitchFamily="49" charset="0"/>
+            </a:endParaRPr>
+          </a:p>
+          <a:p>
+            <a:endParaRPr lang="en-US" sz="1800" b="1" dirty="0">
+              <a:latin typeface="Courier New" panose="02070309020205020404" pitchFamily="49" charset="0"/>
+              <a:cs typeface="Courier New" panose="02070309020205020404" pitchFamily="49" charset="0"/>
+            </a:endParaRPr>
+          </a:p>
+          <a:p>
+            <a:endParaRPr lang="en-US" sz="1800" b="1" dirty="0">
+              <a:latin typeface="Courier New" panose="02070309020205020404" pitchFamily="49" charset="0"/>
+              <a:cs typeface="Courier New" panose="02070309020205020404" pitchFamily="49" charset="0"/>
+            </a:endParaRPr>
+          </a:p>
+          <a:p>
+            <a:endParaRPr lang="en-US" sz="1800" b="1" dirty="0">
+              <a:latin typeface="Courier New" panose="02070309020205020404" pitchFamily="49" charset="0"/>
+              <a:cs typeface="Courier New" panose="02070309020205020404" pitchFamily="49" charset="0"/>
+            </a:endParaRPr>
+          </a:p>
+          <a:p>
+            <a:endParaRPr lang="en-US" sz="1800" b="1" dirty="0">
+              <a:latin typeface="Courier New" panose="02070309020205020404" pitchFamily="49" charset="0"/>
+              <a:cs typeface="Courier New" panose="02070309020205020404" pitchFamily="49" charset="0"/>
+            </a:endParaRPr>
+          </a:p>
+          <a:p>
+            <a:endParaRPr lang="en-US" sz="1800" b="1" dirty="0">
+              <a:latin typeface="Courier New" panose="02070309020205020404" pitchFamily="49" charset="0"/>
+              <a:cs typeface="Courier New" panose="02070309020205020404" pitchFamily="49" charset="0"/>
+            </a:endParaRPr>
+          </a:p>
+          <a:p>
+            <a:endParaRPr lang="en-US" sz="1800" b="1" dirty="0">
+              <a:latin typeface="Courier New" panose="02070309020205020404" pitchFamily="49" charset="0"/>
+              <a:cs typeface="Courier New" panose="02070309020205020404" pitchFamily="49" charset="0"/>
+            </a:endParaRPr>
+          </a:p>
+          <a:p>
+            <a:endParaRPr lang="en-US" sz="1800" b="1" dirty="0">
+              <a:latin typeface="Courier New" panose="02070309020205020404" pitchFamily="49" charset="0"/>
+              <a:cs typeface="Courier New" panose="02070309020205020404" pitchFamily="49" charset="0"/>
+            </a:endParaRPr>
+          </a:p>
+          <a:p>
+            <a:endParaRPr lang="en-US" sz="1800" b="1" dirty="0">
+              <a:latin typeface="Courier New" panose="02070309020205020404" pitchFamily="49" charset="0"/>
+              <a:cs typeface="Courier New" panose="02070309020205020404" pitchFamily="49" charset="0"/>
+            </a:endParaRPr>
+          </a:p>
+          <a:p>
+            <a:endParaRPr lang="en-US" sz="1800" b="1" dirty="0">
+              <a:latin typeface="Courier New" panose="02070309020205020404" pitchFamily="49" charset="0"/>
+              <a:cs typeface="Courier New" panose="02070309020205020404" pitchFamily="49" charset="0"/>
+            </a:endParaRPr>
+          </a:p>
+          <a:p>
+            <a:endParaRPr lang="en-US" sz="1800" b="1" dirty="0">
+              <a:latin typeface="Courier New" panose="02070309020205020404" pitchFamily="49" charset="0"/>
+              <a:cs typeface="Courier New" panose="02070309020205020404" pitchFamily="49" charset="0"/>
+            </a:endParaRPr>
+          </a:p>
+          <a:p>
+            <a:endParaRPr lang="en-US" sz="1800" b="1" dirty="0">
+              <a:latin typeface="Courier New" panose="02070309020205020404" pitchFamily="49" charset="0"/>
+              <a:cs typeface="Courier New" panose="02070309020205020404" pitchFamily="49" charset="0"/>
+            </a:endParaRPr>
+          </a:p>
+          <a:p>
+            <a:endParaRPr lang="en-US" sz="1800" b="1" dirty="0">
+              <a:latin typeface="Courier New" panose="02070309020205020404" pitchFamily="49" charset="0"/>
+              <a:cs typeface="Courier New" panose="02070309020205020404" pitchFamily="49" charset="0"/>
+            </a:endParaRPr>
+          </a:p>
+          <a:p>
+            <a:endParaRPr lang="en-US" sz="1800" b="1" dirty="0">
+              <a:latin typeface="Courier New" panose="02070309020205020404" pitchFamily="49" charset="0"/>
+              <a:cs typeface="Courier New" panose="02070309020205020404" pitchFamily="49" charset="0"/>
+            </a:endParaRPr>
+          </a:p>
+          <a:p>
+            <a:endParaRPr lang="en-US" sz="1800" b="1" dirty="0">
+              <a:latin typeface="Courier New" panose="02070309020205020404" pitchFamily="49" charset="0"/>
+              <a:cs typeface="Courier New" panose="02070309020205020404" pitchFamily="49" charset="0"/>
+            </a:endParaRPr>
+          </a:p>
+          <a:p>
+            <a:endParaRPr lang="en-US" sz="1800" b="1" dirty="0">
+              <a:latin typeface="Courier New" panose="02070309020205020404" pitchFamily="49" charset="0"/>
+              <a:cs typeface="Courier New" panose="02070309020205020404" pitchFamily="49" charset="0"/>
+            </a:endParaRPr>
+          </a:p>
+          <a:p>
+            <a:endParaRPr lang="en-US" sz="1800" b="1" dirty="0">
+              <a:latin typeface="Courier New" panose="02070309020205020404" pitchFamily="49" charset="0"/>
+              <a:cs typeface="Courier New" panose="02070309020205020404" pitchFamily="49" charset="0"/>
+            </a:endParaRPr>
+          </a:p>
+          <a:p>
+            <a:endParaRPr lang="en-US" sz="1800" b="1" dirty="0">
+              <a:latin typeface="Courier New" panose="02070309020205020404" pitchFamily="49" charset="0"/>
+              <a:cs typeface="Courier New" panose="02070309020205020404" pitchFamily="49" charset="0"/>
+            </a:endParaRPr>
+          </a:p>
+          <a:p>
+            <a:endParaRPr lang="en-US" sz="1800" b="1" dirty="0">
+              <a:latin typeface="Courier New" panose="02070309020205020404" pitchFamily="49" charset="0"/>
+              <a:cs typeface="Courier New" panose="02070309020205020404" pitchFamily="49" charset="0"/>
+            </a:endParaRPr>
+          </a:p>
+          <a:p>
+            <a:endParaRPr lang="en-US" sz="1800" b="1" dirty="0">
+              <a:latin typeface="Courier New" panose="02070309020205020404" pitchFamily="49" charset="0"/>
+              <a:cs typeface="Courier New" panose="02070309020205020404" pitchFamily="49" charset="0"/>
+            </a:endParaRPr>
+          </a:p>
+          <a:p>
+            <a:endParaRPr lang="en-US" sz="1800" b="1" dirty="0">
+              <a:latin typeface="Courier New" panose="02070309020205020404" pitchFamily="49" charset="0"/>
+              <a:cs typeface="Courier New" panose="02070309020205020404" pitchFamily="49" charset="0"/>
+            </a:endParaRPr>
+          </a:p>
+          <a:p>
+            <a:endParaRPr lang="en-US" sz="1800" b="1" dirty="0">
+              <a:latin typeface="Courier New" panose="02070309020205020404" pitchFamily="49" charset="0"/>
+              <a:cs typeface="Courier New" panose="02070309020205020404" pitchFamily="49" charset="0"/>
+            </a:endParaRPr>
+          </a:p>
+          <a:p>
+            <a:endParaRPr lang="en-US" sz="1800" b="1" dirty="0">
+              <a:latin typeface="Courier New" panose="02070309020205020404" pitchFamily="49" charset="0"/>
+              <a:cs typeface="Courier New" panose="02070309020205020404" pitchFamily="49" charset="0"/>
+            </a:endParaRPr>
+          </a:p>
+          <a:p>
+            <a:endParaRPr lang="en-US" sz="1800" b="1" dirty="0">
+              <a:latin typeface="Courier New" panose="02070309020205020404" pitchFamily="49" charset="0"/>
+              <a:cs typeface="Courier New" panose="02070309020205020404" pitchFamily="49" charset="0"/>
+            </a:endParaRPr>
+          </a:p>
+          <a:p>
+            <a:endParaRPr lang="en-US" sz="1800" b="1" dirty="0">
+              <a:latin typeface="Courier New" panose="02070309020205020404" pitchFamily="49" charset="0"/>
+              <a:cs typeface="Courier New" panose="02070309020205020404" pitchFamily="49" charset="0"/>
+            </a:endParaRPr>
+          </a:p>
+          <a:p>
+            <a:endParaRPr lang="en-US" sz="1800" b="1" dirty="0">
+              <a:latin typeface="Courier New" panose="02070309020205020404" pitchFamily="49" charset="0"/>
+              <a:cs typeface="Courier New" panose="02070309020205020404" pitchFamily="49" charset="0"/>
+            </a:endParaRPr>
+          </a:p>
+          <a:p>
+            <a:endParaRPr lang="en-US" sz="1800" b="1" dirty="0">
+              <a:latin typeface="Courier New" panose="02070309020205020404" pitchFamily="49" charset="0"/>
+              <a:cs typeface="Courier New" panose="02070309020205020404" pitchFamily="49" charset="0"/>
+            </a:endParaRPr>
+          </a:p>
+          <a:p>
+            <a:endParaRPr lang="en-US" sz="1800" b="1" dirty="0">
+              <a:latin typeface="Courier New" panose="02070309020205020404" pitchFamily="49" charset="0"/>
+              <a:cs typeface="Courier New" panose="02070309020205020404" pitchFamily="49" charset="0"/>
+            </a:endParaRPr>
+          </a:p>
+          <a:p>
+            <a:endParaRPr lang="en-US" sz="1800" b="1" dirty="0">
+              <a:latin typeface="Courier New" panose="02070309020205020404" pitchFamily="49" charset="0"/>
+              <a:cs typeface="Courier New" panose="02070309020205020404" pitchFamily="49" charset="0"/>
+            </a:endParaRPr>
+          </a:p>
+          <a:p>
+            <a:r>
+              <a:rPr lang="en-US" sz="1800" b="1" dirty="0">
+                <a:latin typeface="Courier New" panose="02070309020205020404" pitchFamily="49" charset="0"/>
+                <a:cs typeface="Courier New" panose="02070309020205020404" pitchFamily="49" charset="0"/>
+              </a:rPr>
+              <a:t>##    Min. 1st Qu.  Median    Mean 3rd Qu.    Max. </a:t>
+            </a:r>
+          </a:p>
+          <a:p>
+            <a:r>
+              <a:rPr lang="en-US" sz="1800" b="1" dirty="0">
+                <a:latin typeface="Courier New" panose="02070309020205020404" pitchFamily="49" charset="0"/>
+                <a:cs typeface="Courier New" panose="02070309020205020404" pitchFamily="49" charset="0"/>
+              </a:rPr>
+              <a:t>##   0.200   0.600   1.100   1.184   1.500   3.000</a:t>
+            </a:r>
+          </a:p>
+        </p:txBody>
+      </p:sp>
+      <p:sp>
+        <p:nvSpPr>
+          <p:cNvPr id="4" name="Footer Placeholder 3"/>
+          <p:cNvSpPr>
+            <a:spLocks noGrp="1"/>
+          </p:cNvSpPr>
+          <p:nvPr>
+            <p:ph type="ftr" sz="quarter" idx="10"/>
+          </p:nvPr>
+        </p:nvSpPr>
+        <p:spPr/>
+        <p:txBody>
+          <a:bodyPr/>
+          <a:lstStyle/>
+          <a:p>
+            <a:pPr>
+              <a:defRPr/>
+            </a:pPr>
+            <a:r>
+              <a:rPr lang="en-US" altLang="en-US" dirty="0"/>
+              <a:t>©2018 Steve Simon    http://TheAnalysisFactor.com</a:t>
+            </a:r>
+          </a:p>
+        </p:txBody>
+      </p:sp>
+      <p:sp>
+        <p:nvSpPr>
+          <p:cNvPr id="5" name="Slide Number Placeholder 4"/>
+          <p:cNvSpPr>
+            <a:spLocks noGrp="1"/>
+          </p:cNvSpPr>
+          <p:nvPr>
+            <p:ph type="sldNum" sz="quarter" idx="11"/>
+          </p:nvPr>
+        </p:nvSpPr>
+        <p:spPr/>
+        <p:txBody>
+          <a:bodyPr/>
+          <a:lstStyle/>
+          <a:p>
+            <a:pPr>
+              <a:defRPr/>
+            </a:pPr>
+            <a:endParaRPr lang="en-US"/>
+          </a:p>
+          <a:p>
+            <a:pPr>
+              <a:defRPr/>
+            </a:pPr>
+            <a:fld id="{E9A8CBA3-AA2B-46A6-BFA3-DCEBEAAB3F0A}" type="slidenum">
+              <a:rPr lang="en-US" smtClean="0"/>
+              <a:pPr>
+                <a:defRPr/>
+              </a:pPr>
+              <a:t>21</a:t>
+            </a:fld>
+            <a:endParaRPr lang="en-US"/>
+          </a:p>
+        </p:txBody>
+      </p:sp>
+      <p:sp>
+        <p:nvSpPr>
+          <p:cNvPr id="6" name="Text Placeholder 5"/>
+          <p:cNvSpPr>
+            <a:spLocks noGrp="1"/>
+          </p:cNvSpPr>
+          <p:nvPr>
+            <p:ph type="body" sz="quarter" idx="12"/>
+          </p:nvPr>
+        </p:nvSpPr>
+        <p:spPr/>
+        <p:txBody>
+          <a:bodyPr/>
+          <a:lstStyle/>
+          <a:p>
+            <a:r>
+              <a:rPr lang="en-US" b="1" dirty="0">
+                <a:latin typeface="Courier New" panose="02070309020205020404" pitchFamily="49" charset="0"/>
+                <a:cs typeface="Courier New" panose="02070309020205020404" pitchFamily="49" charset="0"/>
+              </a:rPr>
+              <a:t>Descriptive statistics.</a:t>
+            </a:r>
+            <a:endParaRPr lang="en-US" dirty="0"/>
+          </a:p>
+        </p:txBody>
+      </p:sp>
+    </p:spTree>
+    <p:extLst>
+      <p:ext uri="{BB962C8B-B14F-4D97-AF65-F5344CB8AC3E}">
+        <p14:creationId xmlns:p14="http://schemas.microsoft.com/office/powerpoint/2010/main" val="491449933"/>
+      </p:ext>
+    </p:extLst>
+  </p:cSld>
+  <p:clrMapOvr>
+    <a:masterClrMapping/>
+  </p:clrMapOvr>
+</p:sld>
+</file>
+
+<file path=ppt/slides/slide22.xml><?xml version="1.0" encoding="utf-8"?>
+<p:sld xmlns:a="http://schemas.openxmlformats.org/drawingml/2006/main" xmlns:r="http://schemas.openxmlformats.org/officeDocument/2006/relationships" xmlns:p="http://schemas.openxmlformats.org/presentationml/2006/main">
+  <p:cSld>
+    <p:spTree>
+      <p:nvGrpSpPr>
+        <p:cNvPr id="1" name=""/>
+        <p:cNvGrpSpPr/>
+        <p:nvPr/>
+      </p:nvGrpSpPr>
+      <p:grpSpPr>
+        <a:xfrm>
+          <a:off x="0" y="0"/>
+          <a:ext cx="0" cy="0"/>
+          <a:chOff x="0" y="0"/>
+          <a:chExt cx="0" cy="0"/>
+        </a:xfrm>
+      </p:grpSpPr>
+      <p:sp>
+        <p:nvSpPr>
+          <p:cNvPr id="2" name="Title 1"/>
+          <p:cNvSpPr>
+            <a:spLocks noGrp="1"/>
+          </p:cNvSpPr>
+          <p:nvPr>
+            <p:ph type="title"/>
+          </p:nvPr>
+        </p:nvSpPr>
+        <p:spPr/>
+        <p:txBody>
+          <a:bodyPr/>
+          <a:lstStyle/>
+          <a:p>
+            <a:r>
+              <a:rPr lang="en-US" dirty="0"/>
+              <a:t>Kidney data set</a:t>
+            </a:r>
+          </a:p>
+        </p:txBody>
+      </p:sp>
+      <p:sp>
+        <p:nvSpPr>
+          <p:cNvPr id="4" name="Footer Placeholder 3"/>
+          <p:cNvSpPr>
+            <a:spLocks noGrp="1"/>
+          </p:cNvSpPr>
+          <p:nvPr>
+            <p:ph type="ftr" sz="quarter" idx="10"/>
+          </p:nvPr>
+        </p:nvSpPr>
+        <p:spPr/>
+        <p:txBody>
+          <a:bodyPr/>
+          <a:lstStyle/>
+          <a:p>
+            <a:pPr>
+              <a:defRPr/>
+            </a:pPr>
+            <a:r>
+              <a:rPr lang="en-US" altLang="en-US" dirty="0"/>
+              <a:t>©2018 Steve Simon    http://TheAnalysisFactor.com</a:t>
+            </a:r>
+          </a:p>
+        </p:txBody>
+      </p:sp>
+      <p:sp>
+        <p:nvSpPr>
+          <p:cNvPr id="5" name="Slide Number Placeholder 4"/>
+          <p:cNvSpPr>
+            <a:spLocks noGrp="1"/>
+          </p:cNvSpPr>
+          <p:nvPr>
+            <p:ph type="sldNum" sz="quarter" idx="11"/>
+          </p:nvPr>
+        </p:nvSpPr>
+        <p:spPr/>
+        <p:txBody>
+          <a:bodyPr/>
+          <a:lstStyle/>
+          <a:p>
+            <a:pPr>
+              <a:defRPr/>
+            </a:pPr>
+            <a:endParaRPr lang="en-US"/>
+          </a:p>
+          <a:p>
+            <a:pPr>
+              <a:defRPr/>
+            </a:pPr>
+            <a:fld id="{E9A8CBA3-AA2B-46A6-BFA3-DCEBEAAB3F0A}" type="slidenum">
+              <a:rPr lang="en-US" smtClean="0"/>
+              <a:pPr>
+                <a:defRPr/>
+              </a:pPr>
+              <a:t>22</a:t>
+            </a:fld>
+            <a:endParaRPr lang="en-US"/>
+          </a:p>
+        </p:txBody>
+      </p:sp>
+      <p:pic>
+        <p:nvPicPr>
+          <p:cNvPr id="7" name="Picture 6">
+            <a:extLst>
+              <a:ext uri="{FF2B5EF4-FFF2-40B4-BE49-F238E27FC236}">
+                <a16:creationId xmlns:a16="http://schemas.microsoft.com/office/drawing/2014/main" id="{EED32372-9D11-45DB-A5F2-17C50E19353C}"/>
+              </a:ext>
+            </a:extLst>
+          </p:cNvPr>
+          <p:cNvPicPr>
+            <a:picLocks noChangeAspect="1"/>
+          </p:cNvPicPr>
+          <p:nvPr/>
+        </p:nvPicPr>
+        <p:blipFill>
+          <a:blip r:embed="rId2"/>
+          <a:stretch>
+            <a:fillRect/>
+          </a:stretch>
+        </p:blipFill>
+        <p:spPr>
+          <a:xfrm>
+            <a:off x="457714" y="1143285"/>
+            <a:ext cx="8228571" cy="4571429"/>
+          </a:xfrm>
+          <a:prstGeom prst="rect">
+            <a:avLst/>
+          </a:prstGeom>
+        </p:spPr>
+      </p:pic>
+    </p:spTree>
+    <p:extLst>
+      <p:ext uri="{BB962C8B-B14F-4D97-AF65-F5344CB8AC3E}">
+        <p14:creationId xmlns:p14="http://schemas.microsoft.com/office/powerpoint/2010/main" val="3277170177"/>
+      </p:ext>
+    </p:extLst>
+  </p:cSld>
+  <p:clrMapOvr>
+    <a:masterClrMapping/>
+  </p:clrMapOvr>
+</p:sld>
+</file>
+
+<file path=ppt/slides/slide23.xml><?xml version="1.0" encoding="utf-8"?>
+<p:sld xmlns:a="http://schemas.openxmlformats.org/drawingml/2006/main" xmlns:r="http://schemas.openxmlformats.org/officeDocument/2006/relationships" xmlns:p="http://schemas.openxmlformats.org/presentationml/2006/main">
+  <p:cSld>
+    <p:spTree>
+      <p:nvGrpSpPr>
+        <p:cNvPr id="1" name=""/>
+        <p:cNvGrpSpPr/>
+        <p:nvPr/>
+      </p:nvGrpSpPr>
+      <p:grpSpPr>
+        <a:xfrm>
+          <a:off x="0" y="0"/>
+          <a:ext cx="0" cy="0"/>
+          <a:chOff x="0" y="0"/>
+          <a:chExt cx="0" cy="0"/>
+        </a:xfrm>
+      </p:grpSpPr>
+      <p:sp>
+        <p:nvSpPr>
+          <p:cNvPr id="2" name="Title 1"/>
+          <p:cNvSpPr>
+            <a:spLocks noGrp="1"/>
+          </p:cNvSpPr>
+          <p:nvPr>
+            <p:ph type="title"/>
+          </p:nvPr>
+        </p:nvSpPr>
+        <p:spPr/>
+        <p:txBody>
+          <a:bodyPr/>
+          <a:lstStyle/>
+          <a:p>
+            <a:r>
+              <a:rPr lang="en-US" dirty="0"/>
+              <a:t>Cluster models</a:t>
+            </a:r>
+          </a:p>
+        </p:txBody>
+      </p:sp>
+      <p:sp>
+        <p:nvSpPr>
+          <p:cNvPr id="4" name="Footer Placeholder 3"/>
+          <p:cNvSpPr>
+            <a:spLocks noGrp="1"/>
+          </p:cNvSpPr>
+          <p:nvPr>
+            <p:ph type="ftr" sz="quarter" idx="10"/>
+          </p:nvPr>
+        </p:nvSpPr>
+        <p:spPr/>
+        <p:txBody>
+          <a:bodyPr/>
+          <a:lstStyle/>
+          <a:p>
+            <a:pPr>
+              <a:defRPr/>
+            </a:pPr>
+            <a:r>
+              <a:rPr lang="en-US" altLang="en-US" dirty="0"/>
+              <a:t>©2018 Steve Simon    http://TheAnalysisFactor.com</a:t>
+            </a:r>
+          </a:p>
+        </p:txBody>
+      </p:sp>
+      <p:sp>
+        <p:nvSpPr>
+          <p:cNvPr id="5" name="Slide Number Placeholder 4"/>
+          <p:cNvSpPr>
+            <a:spLocks noGrp="1"/>
+          </p:cNvSpPr>
+          <p:nvPr>
+            <p:ph type="sldNum" sz="quarter" idx="11"/>
+          </p:nvPr>
+        </p:nvSpPr>
+        <p:spPr/>
+        <p:txBody>
+          <a:bodyPr/>
+          <a:lstStyle/>
+          <a:p>
+            <a:pPr>
+              <a:defRPr/>
+            </a:pPr>
+            <a:endParaRPr lang="en-US"/>
+          </a:p>
+          <a:p>
+            <a:pPr>
+              <a:defRPr/>
+            </a:pPr>
+            <a:fld id="{E9A8CBA3-AA2B-46A6-BFA3-DCEBEAAB3F0A}" type="slidenum">
+              <a:rPr lang="en-US" smtClean="0"/>
+              <a:pPr>
+                <a:defRPr/>
+              </a:pPr>
+              <a:t>23</a:t>
             </a:fld>
             <a:endParaRPr lang="en-US"/>
           </a:p>
@@ -4366,7 +7627,7 @@
     </p:spTree>
     <p:extLst>
       <p:ext uri="{BB962C8B-B14F-4D97-AF65-F5344CB8AC3E}">
-        <p14:creationId xmlns:p14="http://schemas.microsoft.com/office/powerpoint/2010/main" val="3277170177"/>
+        <p14:creationId xmlns:p14="http://schemas.microsoft.com/office/powerpoint/2010/main" val="2757786098"/>
       </p:ext>
     </p:extLst>
   </p:cSld>
@@ -4376,7 +7637,7 @@
 </p:sld>
 </file>
 
-<file path=ppt/slides/slide12.xml><?xml version="1.0" encoding="utf-8"?>
+<file path=ppt/slides/slide24.xml><?xml version="1.0" encoding="utf-8"?>
 <p:sld xmlns:a="http://schemas.openxmlformats.org/drawingml/2006/main" xmlns:r="http://schemas.openxmlformats.org/officeDocument/2006/relationships" xmlns:p="http://schemas.openxmlformats.org/presentationml/2006/main">
   <p:cSld>
     <p:spTree>
@@ -4469,7 +7730,7 @@
               <a:pPr>
                 <a:defRPr/>
               </a:pPr>
-              <a:t>12</a:t>
+              <a:t>24</a:t>
             </a:fld>
             <a:endParaRPr lang="en-US"/>
           </a:p>
@@ -4518,7 +7779,7 @@
 </p:sld>
 </file>
 
-<file path=ppt/slides/slide13.xml><?xml version="1.0" encoding="utf-8"?>
+<file path=ppt/slides/slide25.xml><?xml version="1.0" encoding="utf-8"?>
 <p:sld xmlns:a="http://schemas.openxmlformats.org/drawingml/2006/main" xmlns:r="http://schemas.openxmlformats.org/officeDocument/2006/relationships" xmlns:p="http://schemas.openxmlformats.org/presentationml/2006/main">
   <p:cSld>
     <p:spTree>
@@ -4611,7 +7872,7 @@
               <a:pPr>
                 <a:defRPr/>
               </a:pPr>
-              <a:t>13</a:t>
+              <a:t>25</a:t>
             </a:fld>
             <a:endParaRPr lang="en-US"/>
           </a:p>
@@ -4660,7 +7921,7 @@
 </p:sld>
 </file>
 
-<file path=ppt/slides/slide14.xml><?xml version="1.0" encoding="utf-8"?>
+<file path=ppt/slides/slide26.xml><?xml version="1.0" encoding="utf-8"?>
 <p:sld xmlns:a="http://schemas.openxmlformats.org/drawingml/2006/main" xmlns:r="http://schemas.openxmlformats.org/officeDocument/2006/relationships" xmlns:p="http://schemas.openxmlformats.org/presentationml/2006/main">
   <p:cSld>
     <p:spTree>
@@ -4753,7 +8014,7 @@
               <a:pPr>
                 <a:defRPr/>
               </a:pPr>
-              <a:t>14</a:t>
+              <a:t>26</a:t>
             </a:fld>
             <a:endParaRPr lang="en-US"/>
           </a:p>
@@ -4802,7 +8063,7 @@
 </p:sld>
 </file>
 
-<file path=ppt/slides/slide15.xml><?xml version="1.0" encoding="utf-8"?>
+<file path=ppt/slides/slide27.xml><?xml version="1.0" encoding="utf-8"?>
 <p:sld xmlns:a="http://schemas.openxmlformats.org/drawingml/2006/main" xmlns:r="http://schemas.openxmlformats.org/officeDocument/2006/relationships" xmlns:p="http://schemas.openxmlformats.org/presentationml/2006/main">
   <p:cSld>
     <p:spTree>
@@ -4895,7 +8156,7 @@
               <a:pPr>
                 <a:defRPr/>
               </a:pPr>
-              <a:t>15</a:t>
+              <a:t>27</a:t>
             </a:fld>
             <a:endParaRPr lang="en-US"/>
           </a:p>
@@ -4944,7 +8205,7 @@
 </p:sld>
 </file>
 
-<file path=ppt/slides/slide16.xml><?xml version="1.0" encoding="utf-8"?>
+<file path=ppt/slides/slide28.xml><?xml version="1.0" encoding="utf-8"?>
 <p:sld xmlns:a="http://schemas.openxmlformats.org/drawingml/2006/main" xmlns:r="http://schemas.openxmlformats.org/officeDocument/2006/relationships" xmlns:p="http://schemas.openxmlformats.org/presentationml/2006/main">
   <p:cSld>
     <p:spTree>
@@ -5062,7 +8323,7 @@
               <a:pPr>
                 <a:defRPr/>
               </a:pPr>
-              <a:t>16</a:t>
+              <a:t>28</a:t>
             </a:fld>
             <a:endParaRPr lang="en-US"/>
           </a:p>
@@ -5094,162 +8355,6 @@
     <p:extLst>
       <p:ext uri="{BB962C8B-B14F-4D97-AF65-F5344CB8AC3E}">
         <p14:creationId xmlns:p14="http://schemas.microsoft.com/office/powerpoint/2010/main" val="1691035053"/>
-      </p:ext>
-    </p:extLst>
-  </p:cSld>
-  <p:clrMapOvr>
-    <a:masterClrMapping/>
-  </p:clrMapOvr>
-</p:sld>
-</file>
-
-<file path=ppt/slides/slide2.xml><?xml version="1.0" encoding="utf-8"?>
-<p:sld xmlns:a="http://schemas.openxmlformats.org/drawingml/2006/main" xmlns:r="http://schemas.openxmlformats.org/officeDocument/2006/relationships" xmlns:p="http://schemas.openxmlformats.org/presentationml/2006/main">
-  <p:cSld>
-    <p:spTree>
-      <p:nvGrpSpPr>
-        <p:cNvPr id="1" name=""/>
-        <p:cNvGrpSpPr/>
-        <p:nvPr/>
-      </p:nvGrpSpPr>
-      <p:grpSpPr>
-        <a:xfrm>
-          <a:off x="0" y="0"/>
-          <a:ext cx="0" cy="0"/>
-          <a:chOff x="0" y="0"/>
-          <a:chExt cx="0" cy="0"/>
-        </a:xfrm>
-      </p:grpSpPr>
-      <p:sp>
-        <p:nvSpPr>
-          <p:cNvPr id="2" name="Title 1"/>
-          <p:cNvSpPr>
-            <a:spLocks noGrp="1"/>
-          </p:cNvSpPr>
-          <p:nvPr>
-            <p:ph type="title"/>
-          </p:nvPr>
-        </p:nvSpPr>
-        <p:spPr/>
-        <p:txBody>
-          <a:bodyPr/>
-          <a:lstStyle/>
-          <a:p>
-            <a:r>
-              <a:rPr lang="en-US" dirty="0"/>
-              <a:t>Abstract</a:t>
-            </a:r>
-          </a:p>
-        </p:txBody>
-      </p:sp>
-      <p:sp>
-        <p:nvSpPr>
-          <p:cNvPr id="3" name="Text Placeholder 2"/>
-          <p:cNvSpPr>
-            <a:spLocks noGrp="1"/>
-          </p:cNvSpPr>
-          <p:nvPr>
-            <p:ph type="body" idx="1"/>
-          </p:nvPr>
-        </p:nvSpPr>
-        <p:spPr/>
-        <p:txBody>
-          <a:bodyPr/>
-          <a:lstStyle/>
-          <a:p>
-            <a:r>
-              <a:rPr lang="en-US" dirty="0"/>
-              <a:t>Lecture 7. Frailty models. You can incorporate multiple events per patient and account for center effects using frailty models, the survival data analysis equivalent to mixed models in linear regression. You’ll see how to define random effects and how to fit and interpret these models.</a:t>
-            </a:r>
-          </a:p>
-        </p:txBody>
-      </p:sp>
-      <p:sp>
-        <p:nvSpPr>
-          <p:cNvPr id="4" name="Footer Placeholder 3"/>
-          <p:cNvSpPr>
-            <a:spLocks noGrp="1"/>
-          </p:cNvSpPr>
-          <p:nvPr>
-            <p:ph type="ftr" sz="quarter" idx="10"/>
-          </p:nvPr>
-        </p:nvSpPr>
-        <p:spPr/>
-        <p:txBody>
-          <a:bodyPr/>
-          <a:lstStyle/>
-          <a:p>
-            <a:pPr>
-              <a:defRPr/>
-            </a:pPr>
-            <a:r>
-              <a:rPr lang="en-US" altLang="en-US" dirty="0"/>
-              <a:t>©2018 Steve Simon    http://TheAnalysisFactor.com</a:t>
-            </a:r>
-          </a:p>
-        </p:txBody>
-      </p:sp>
-      <p:sp>
-        <p:nvSpPr>
-          <p:cNvPr id="5" name="Slide Number Placeholder 4"/>
-          <p:cNvSpPr>
-            <a:spLocks noGrp="1"/>
-          </p:cNvSpPr>
-          <p:nvPr>
-            <p:ph type="sldNum" sz="quarter" idx="11"/>
-          </p:nvPr>
-        </p:nvSpPr>
-        <p:spPr/>
-        <p:txBody>
-          <a:bodyPr/>
-          <a:lstStyle/>
-          <a:p>
-            <a:pPr>
-              <a:defRPr/>
-            </a:pPr>
-            <a:endParaRPr lang="en-US"/>
-          </a:p>
-          <a:p>
-            <a:pPr>
-              <a:defRPr/>
-            </a:pPr>
-            <a:fld id="{E9A8CBA3-AA2B-46A6-BFA3-DCEBEAAB3F0A}" type="slidenum">
-              <a:rPr lang="en-US" smtClean="0"/>
-              <a:pPr>
-                <a:defRPr/>
-              </a:pPr>
-              <a:t>2</a:t>
-            </a:fld>
-            <a:endParaRPr lang="en-US"/>
-          </a:p>
-        </p:txBody>
-      </p:sp>
-      <p:sp>
-        <p:nvSpPr>
-          <p:cNvPr id="6" name="Text Placeholder 5"/>
-          <p:cNvSpPr>
-            <a:spLocks noGrp="1"/>
-          </p:cNvSpPr>
-          <p:nvPr>
-            <p:ph type="body" sz="quarter" idx="12"/>
-          </p:nvPr>
-        </p:nvSpPr>
-        <p:spPr/>
-        <p:txBody>
-          <a:bodyPr/>
-          <a:lstStyle/>
-          <a:p>
-            <a:r>
-              <a:rPr lang="en-US" dirty="0"/>
-              <a:t>Lecture 7.</a:t>
-            </a:r>
-          </a:p>
-        </p:txBody>
-      </p:sp>
-    </p:spTree>
-    <p:extLst>
-      <p:ext uri="{BB962C8B-B14F-4D97-AF65-F5344CB8AC3E}">
-        <p14:creationId xmlns:p14="http://schemas.microsoft.com/office/powerpoint/2010/main" val="3091858404"/>
       </p:ext>
     </p:extLst>
   </p:cSld>

</xml_diff>